<commit_message>
Microservices connected, REST API works
</commit_message>
<xml_diff>
--- a/Internet stvari i servisa2.pptx
+++ b/Internet stvari i servisa2.pptx
@@ -280,7 +280,7 @@
           <a:p>
             <a:fld id="{24CE221E-83ED-4F6C-BA5F-3F9E6FDB6953}" type="datetimeFigureOut">
               <a:rPr lang="en-US"/>
-              <a:t>5/22/2024</a:t>
+              <a:t>5/25/2024</a:t>
             </a:fld>
             <a:endParaRPr dirty="0"/>
           </a:p>
@@ -445,7 +445,7 @@
           <a:p>
             <a:fld id="{97853E5F-CE67-483C-A264-F17AC70E9CA2}" type="datetimeFigureOut">
               <a:rPr lang="en-US"/>
-              <a:t>5/22/2024</a:t>
+              <a:t>5/25/2024</a:t>
             </a:fld>
             <a:endParaRPr dirty="0"/>
           </a:p>
@@ -1037,7 +1037,7 @@
           <a:p>
             <a:fld id="{3E0FA9E5-6744-4841-888F-9E7CC0C2B7EC}" type="datetimeFigureOut">
               <a:rPr lang="en-US" smtClean="0"/>
-              <a:t>5/22/2024</a:t>
+              <a:t>5/25/2024</a:t>
             </a:fld>
             <a:endParaRPr lang="en-US" dirty="0"/>
           </a:p>
@@ -1227,7 +1227,7 @@
           <a:p>
             <a:fld id="{3E0FA9E5-6744-4841-888F-9E7CC0C2B7EC}" type="datetimeFigureOut">
               <a:rPr lang="en-US" smtClean="0"/>
-              <a:t>5/22/2024</a:t>
+              <a:t>5/25/2024</a:t>
             </a:fld>
             <a:endParaRPr lang="en-US" dirty="0"/>
           </a:p>
@@ -1422,7 +1422,7 @@
           <a:p>
             <a:fld id="{3E0FA9E5-6744-4841-888F-9E7CC0C2B7EC}" type="datetimeFigureOut">
               <a:rPr lang="en-US" smtClean="0"/>
-              <a:t>5/22/2024</a:t>
+              <a:t>5/25/2024</a:t>
             </a:fld>
             <a:endParaRPr lang="en-US" dirty="0"/>
           </a:p>
@@ -1607,7 +1607,7 @@
           <a:p>
             <a:fld id="{3E0FA9E5-6744-4841-888F-9E7CC0C2B7EC}" type="datetimeFigureOut">
               <a:rPr lang="en-US" smtClean="0"/>
-              <a:t>5/22/2024</a:t>
+              <a:t>5/25/2024</a:t>
             </a:fld>
             <a:endParaRPr lang="en-US" dirty="0"/>
           </a:p>
@@ -1876,7 +1876,7 @@
           <a:p>
             <a:fld id="{3E0FA9E5-6744-4841-888F-9E7CC0C2B7EC}" type="datetimeFigureOut">
               <a:rPr lang="en-US" smtClean="0"/>
-              <a:t>5/22/2024</a:t>
+              <a:t>5/25/2024</a:t>
             </a:fld>
             <a:endParaRPr lang="en-US" dirty="0"/>
           </a:p>
@@ -2183,7 +2183,7 @@
           <a:p>
             <a:fld id="{3E0FA9E5-6744-4841-888F-9E7CC0C2B7EC}" type="datetimeFigureOut">
               <a:rPr lang="en-US" smtClean="0"/>
-              <a:t>5/22/2024</a:t>
+              <a:t>5/25/2024</a:t>
             </a:fld>
             <a:endParaRPr lang="en-US" dirty="0"/>
           </a:p>
@@ -2639,7 +2639,7 @@
           <a:p>
             <a:fld id="{3E0FA9E5-6744-4841-888F-9E7CC0C2B7EC}" type="datetimeFigureOut">
               <a:rPr lang="en-US" smtClean="0"/>
-              <a:t>5/22/2024</a:t>
+              <a:t>5/25/2024</a:t>
             </a:fld>
             <a:endParaRPr lang="en-US" dirty="0"/>
           </a:p>
@@ -2772,7 +2772,7 @@
           <a:p>
             <a:fld id="{3E0FA9E5-6744-4841-888F-9E7CC0C2B7EC}" type="datetimeFigureOut">
               <a:rPr lang="en-US" smtClean="0"/>
-              <a:t>5/22/2024</a:t>
+              <a:t>5/25/2024</a:t>
             </a:fld>
             <a:endParaRPr lang="en-US" dirty="0"/>
           </a:p>
@@ -2882,7 +2882,7 @@
           <a:p>
             <a:fld id="{3E0FA9E5-6744-4841-888F-9E7CC0C2B7EC}" type="datetimeFigureOut">
               <a:rPr lang="en-US" smtClean="0"/>
-              <a:t>5/22/2024</a:t>
+              <a:t>5/25/2024</a:t>
             </a:fld>
             <a:endParaRPr lang="en-US" dirty="0"/>
           </a:p>
@@ -3193,7 +3193,7 @@
           <a:p>
             <a:fld id="{3E0FA9E5-6744-4841-888F-9E7CC0C2B7EC}" type="datetimeFigureOut">
               <a:rPr lang="en-US" smtClean="0"/>
-              <a:t>5/22/2024</a:t>
+              <a:t>5/25/2024</a:t>
             </a:fld>
             <a:endParaRPr lang="en-US" dirty="0"/>
           </a:p>
@@ -3670,7 +3670,7 @@
             <a:fld id="{3E0FA9E5-6744-4841-888F-9E7CC0C2B7EC}" type="datetimeFigureOut">
               <a:rPr lang="en-US" smtClean="0"/>
               <a:pPr/>
-              <a:t>5/22/2024</a:t>
+              <a:t>5/25/2024</a:t>
             </a:fld>
             <a:endParaRPr lang="en-US" dirty="0"/>
           </a:p>
@@ -4769,7 +4769,7 @@
           <a:p>
             <a:r>
               <a:rPr lang="en-US" dirty="0"/>
-              <a:t>Today’s Situation</a:t>
+              <a:t>Analytics Microservice</a:t>
             </a:r>
           </a:p>
         </p:txBody>
@@ -4860,9 +4860,10 @@
           <a:lstStyle/>
           <a:p>
             <a:r>
-              <a:rPr lang="en-US" dirty="0"/>
-              <a:t>How Did We Get Here?</a:t>
-            </a:r>
+              <a:rPr lang="en-US" dirty="0" err="1"/>
+              <a:t>EventInfo</a:t>
+            </a:r>
+            <a:endParaRPr lang="en-US" dirty="0"/>
           </a:p>
         </p:txBody>
       </p:sp>
@@ -4953,7 +4954,7 @@
           <a:p>
             <a:r>
               <a:rPr lang="en-US" dirty="0"/>
-              <a:t>Available Options</a:t>
+              <a:t>Docker</a:t>
             </a:r>
           </a:p>
         </p:txBody>
@@ -5049,53 +5050,45 @@
           <a:bodyPr/>
           <a:lstStyle/>
           <a:p>
-            <a:r>
-              <a:rPr lang="en-US" dirty="0"/>
-              <a:t>Recommendation</a:t>
-            </a:r>
-          </a:p>
-        </p:txBody>
-      </p:sp>
-      <p:sp>
-        <p:nvSpPr>
-          <p:cNvPr id="3" name="Content Placeholder 2"/>
-          <p:cNvSpPr>
-            <a:spLocks noGrp="1"/>
-          </p:cNvSpPr>
+            <a:endParaRPr lang="en-US" dirty="0"/>
+          </a:p>
+        </p:txBody>
+      </p:sp>
+      <p:pic>
+        <p:nvPicPr>
+          <p:cNvPr id="5" name="Content Placeholder 4" descr="A white text on a red background&#10;&#10;Description automatically generated">
+            <a:extLst>
+              <a:ext uri="{FF2B5EF4-FFF2-40B4-BE49-F238E27FC236}">
+                <a16:creationId xmlns:a16="http://schemas.microsoft.com/office/drawing/2014/main" id="{7B8D8CB4-A90E-C4DC-3A07-2C1BAA0EEB7C}"/>
+              </a:ext>
+            </a:extLst>
+          </p:cNvPr>
+          <p:cNvPicPr>
+            <a:picLocks noGrp="1" noChangeAspect="1"/>
+          </p:cNvPicPr>
           <p:nvPr>
             <p:ph idx="1"/>
           </p:nvPr>
-        </p:nvSpPr>
-        <p:spPr/>
-        <p:txBody>
-          <a:bodyPr/>
-          <a:lstStyle/>
-          <a:p>
-            <a:r>
-              <a:rPr lang="en-US" dirty="0"/>
-              <a:t>Recommend one or more of the strategies.</a:t>
-            </a:r>
-          </a:p>
-          <a:p>
-            <a:r>
-              <a:rPr lang="en-US" dirty="0"/>
-              <a:t>Summarize the results if things go as proposed.</a:t>
-            </a:r>
-          </a:p>
-          <a:p>
-            <a:r>
-              <a:rPr lang="en-US" dirty="0"/>
-              <a:t>What to do next.</a:t>
-            </a:r>
-          </a:p>
-          <a:p>
-            <a:r>
-              <a:rPr lang="en-US" dirty="0"/>
-              <a:t>Identify action items.</a:t>
-            </a:r>
-          </a:p>
-        </p:txBody>
-      </p:sp>
+        </p:nvPicPr>
+        <p:blipFill>
+          <a:blip r:embed="rId2">
+            <a:extLst>
+              <a:ext uri="{28A0092B-C50C-407E-A947-70E740481C1C}">
+                <a14:useLocalDpi xmlns:a14="http://schemas.microsoft.com/office/drawing/2010/main" val="0"/>
+              </a:ext>
+            </a:extLst>
+          </a:blip>
+          <a:stretch>
+            <a:fillRect/>
+          </a:stretch>
+        </p:blipFill>
+        <p:spPr>
+          <a:xfrm>
+            <a:off x="-170284" y="-1177224"/>
+            <a:ext cx="12287100" cy="9212447"/>
+          </a:xfrm>
+        </p:spPr>
+      </p:pic>
     </p:spTree>
     <p:extLst>
       <p:ext uri="{BB962C8B-B14F-4D97-AF65-F5344CB8AC3E}">

</xml_diff>

<commit_message>
EventInfo store refactored, plantId set as a key
</commit_message>
<xml_diff>
--- a/Internet stvari i servisa2.pptx
+++ b/Internet stvari i servisa2.pptx
@@ -5,10 +5,10 @@
     <p:sldMasterId id="2147483660" r:id="rId1"/>
   </p:sldMasterIdLst>
   <p:notesMasterIdLst>
-    <p:notesMasterId r:id="rId9"/>
+    <p:notesMasterId r:id="rId13"/>
   </p:notesMasterIdLst>
   <p:handoutMasterIdLst>
-    <p:handoutMasterId r:id="rId10"/>
+    <p:handoutMasterId r:id="rId14"/>
   </p:handoutMasterIdLst>
   <p:sldIdLst>
     <p:sldId id="257" r:id="rId2"/>
@@ -16,8 +16,12 @@
     <p:sldId id="259" r:id="rId4"/>
     <p:sldId id="260" r:id="rId5"/>
     <p:sldId id="261" r:id="rId6"/>
-    <p:sldId id="262" r:id="rId7"/>
-    <p:sldId id="263" r:id="rId8"/>
+    <p:sldId id="264" r:id="rId7"/>
+    <p:sldId id="265" r:id="rId8"/>
+    <p:sldId id="262" r:id="rId9"/>
+    <p:sldId id="266" r:id="rId10"/>
+    <p:sldId id="267" r:id="rId11"/>
+    <p:sldId id="263" r:id="rId12"/>
   </p:sldIdLst>
   <p:sldSz cx="12188825" cy="6858000"/>
   <p:notesSz cx="6858000" cy="9144000"/>
@@ -280,7 +284,7 @@
           <a:p>
             <a:fld id="{24CE221E-83ED-4F6C-BA5F-3F9E6FDB6953}" type="datetimeFigureOut">
               <a:rPr lang="en-US"/>
-              <a:t>5/26/2024</a:t>
+              <a:t>5/29/2024</a:t>
             </a:fld>
             <a:endParaRPr dirty="0"/>
           </a:p>
@@ -445,7 +449,7 @@
           <a:p>
             <a:fld id="{97853E5F-CE67-483C-A264-F17AC70E9CA2}" type="datetimeFigureOut">
               <a:rPr lang="en-US"/>
-              <a:t>5/26/2024</a:t>
+              <a:t>5/29/2024</a:t>
             </a:fld>
             <a:endParaRPr dirty="0"/>
           </a:p>
@@ -1037,7 +1041,7 @@
           <a:p>
             <a:fld id="{3E0FA9E5-6744-4841-888F-9E7CC0C2B7EC}" type="datetimeFigureOut">
               <a:rPr lang="en-US" smtClean="0"/>
-              <a:t>5/26/2024</a:t>
+              <a:t>5/29/2024</a:t>
             </a:fld>
             <a:endParaRPr lang="en-US" dirty="0"/>
           </a:p>
@@ -1227,7 +1231,7 @@
           <a:p>
             <a:fld id="{3E0FA9E5-6744-4841-888F-9E7CC0C2B7EC}" type="datetimeFigureOut">
               <a:rPr lang="en-US" smtClean="0"/>
-              <a:t>5/26/2024</a:t>
+              <a:t>5/29/2024</a:t>
             </a:fld>
             <a:endParaRPr lang="en-US" dirty="0"/>
           </a:p>
@@ -1422,7 +1426,7 @@
           <a:p>
             <a:fld id="{3E0FA9E5-6744-4841-888F-9E7CC0C2B7EC}" type="datetimeFigureOut">
               <a:rPr lang="en-US" smtClean="0"/>
-              <a:t>5/26/2024</a:t>
+              <a:t>5/29/2024</a:t>
             </a:fld>
             <a:endParaRPr lang="en-US" dirty="0"/>
           </a:p>
@@ -1607,7 +1611,7 @@
           <a:p>
             <a:fld id="{3E0FA9E5-6744-4841-888F-9E7CC0C2B7EC}" type="datetimeFigureOut">
               <a:rPr lang="en-US" smtClean="0"/>
-              <a:t>5/26/2024</a:t>
+              <a:t>5/29/2024</a:t>
             </a:fld>
             <a:endParaRPr lang="en-US" dirty="0"/>
           </a:p>
@@ -1876,7 +1880,7 @@
           <a:p>
             <a:fld id="{3E0FA9E5-6744-4841-888F-9E7CC0C2B7EC}" type="datetimeFigureOut">
               <a:rPr lang="en-US" smtClean="0"/>
-              <a:t>5/26/2024</a:t>
+              <a:t>5/29/2024</a:t>
             </a:fld>
             <a:endParaRPr lang="en-US" dirty="0"/>
           </a:p>
@@ -2183,7 +2187,7 @@
           <a:p>
             <a:fld id="{3E0FA9E5-6744-4841-888F-9E7CC0C2B7EC}" type="datetimeFigureOut">
               <a:rPr lang="en-US" smtClean="0"/>
-              <a:t>5/26/2024</a:t>
+              <a:t>5/29/2024</a:t>
             </a:fld>
             <a:endParaRPr lang="en-US" dirty="0"/>
           </a:p>
@@ -2639,7 +2643,7 @@
           <a:p>
             <a:fld id="{3E0FA9E5-6744-4841-888F-9E7CC0C2B7EC}" type="datetimeFigureOut">
               <a:rPr lang="en-US" smtClean="0"/>
-              <a:t>5/26/2024</a:t>
+              <a:t>5/29/2024</a:t>
             </a:fld>
             <a:endParaRPr lang="en-US" dirty="0"/>
           </a:p>
@@ -2772,7 +2776,7 @@
           <a:p>
             <a:fld id="{3E0FA9E5-6744-4841-888F-9E7CC0C2B7EC}" type="datetimeFigureOut">
               <a:rPr lang="en-US" smtClean="0"/>
-              <a:t>5/26/2024</a:t>
+              <a:t>5/29/2024</a:t>
             </a:fld>
             <a:endParaRPr lang="en-US" dirty="0"/>
           </a:p>
@@ -2882,7 +2886,7 @@
           <a:p>
             <a:fld id="{3E0FA9E5-6744-4841-888F-9E7CC0C2B7EC}" type="datetimeFigureOut">
               <a:rPr lang="en-US" smtClean="0"/>
-              <a:t>5/26/2024</a:t>
+              <a:t>5/29/2024</a:t>
             </a:fld>
             <a:endParaRPr lang="en-US" dirty="0"/>
           </a:p>
@@ -3193,7 +3197,7 @@
           <a:p>
             <a:fld id="{3E0FA9E5-6744-4841-888F-9E7CC0C2B7EC}" type="datetimeFigureOut">
               <a:rPr lang="en-US" smtClean="0"/>
-              <a:t>5/26/2024</a:t>
+              <a:t>5/29/2024</a:t>
             </a:fld>
             <a:endParaRPr lang="en-US" dirty="0"/>
           </a:p>
@@ -3670,7 +3674,7 @@
             <a:fld id="{3E0FA9E5-6744-4841-888F-9E7CC0C2B7EC}" type="datetimeFigureOut">
               <a:rPr lang="en-US" smtClean="0"/>
               <a:pPr/>
-              <a:t>5/26/2024</a:t>
+              <a:t>5/29/2024</a:t>
             </a:fld>
             <a:endParaRPr lang="en-US" dirty="0"/>
           </a:p>
@@ -4201,6 +4205,238 @@
 </p:sld>
 </file>
 
+<file path=ppt/slides/slide10.xml><?xml version="1.0" encoding="utf-8"?>
+<p:sld xmlns:a="http://schemas.openxmlformats.org/drawingml/2006/main" xmlns:r="http://schemas.openxmlformats.org/officeDocument/2006/relationships" xmlns:p="http://schemas.openxmlformats.org/presentationml/2006/main">
+  <p:cSld>
+    <p:spTree>
+      <p:nvGrpSpPr>
+        <p:cNvPr id="1" name=""/>
+        <p:cNvGrpSpPr/>
+        <p:nvPr/>
+      </p:nvGrpSpPr>
+      <p:grpSpPr>
+        <a:xfrm>
+          <a:off x="0" y="0"/>
+          <a:ext cx="0" cy="0"/>
+          <a:chOff x="0" y="0"/>
+          <a:chExt cx="0" cy="0"/>
+        </a:xfrm>
+      </p:grpSpPr>
+      <p:sp>
+        <p:nvSpPr>
+          <p:cNvPr id="2" name="Title 1">
+            <a:extLst>
+              <a:ext uri="{FF2B5EF4-FFF2-40B4-BE49-F238E27FC236}">
+                <a16:creationId xmlns:a16="http://schemas.microsoft.com/office/drawing/2014/main" id="{0252342C-15CB-A03C-8570-9D318200FD4E}"/>
+              </a:ext>
+            </a:extLst>
+          </p:cNvPr>
+          <p:cNvSpPr>
+            <a:spLocks noGrp="1"/>
+          </p:cNvSpPr>
+          <p:nvPr>
+            <p:ph type="title"/>
+          </p:nvPr>
+        </p:nvSpPr>
+        <p:spPr>
+          <a:xfrm>
+            <a:off x="693812" y="260648"/>
+            <a:ext cx="8686801" cy="1066800"/>
+          </a:xfrm>
+        </p:spPr>
+        <p:txBody>
+          <a:bodyPr/>
+          <a:lstStyle/>
+          <a:p>
+            <a:r>
+              <a:rPr lang="en-US" dirty="0"/>
+              <a:t>Rest API testing</a:t>
+            </a:r>
+            <a:endParaRPr lang="en-CH" dirty="0"/>
+          </a:p>
+        </p:txBody>
+      </p:sp>
+      <p:pic>
+        <p:nvPicPr>
+          <p:cNvPr id="5" name="Picture 4">
+            <a:extLst>
+              <a:ext uri="{FF2B5EF4-FFF2-40B4-BE49-F238E27FC236}">
+                <a16:creationId xmlns:a16="http://schemas.microsoft.com/office/drawing/2014/main" id="{D73C4CED-D6F3-4735-D844-75D737E60C51}"/>
+              </a:ext>
+            </a:extLst>
+          </p:cNvPr>
+          <p:cNvPicPr>
+            <a:picLocks noChangeAspect="1"/>
+          </p:cNvPicPr>
+          <p:nvPr/>
+        </p:nvPicPr>
+        <p:blipFill>
+          <a:blip r:embed="rId2"/>
+          <a:stretch>
+            <a:fillRect/>
+          </a:stretch>
+        </p:blipFill>
+        <p:spPr>
+          <a:xfrm>
+            <a:off x="319872" y="1772816"/>
+            <a:ext cx="7378706" cy="1779672"/>
+          </a:xfrm>
+          <a:prstGeom prst="rect">
+            <a:avLst/>
+          </a:prstGeom>
+        </p:spPr>
+      </p:pic>
+      <p:pic>
+        <p:nvPicPr>
+          <p:cNvPr id="7" name="Picture 6">
+            <a:extLst>
+              <a:ext uri="{FF2B5EF4-FFF2-40B4-BE49-F238E27FC236}">
+                <a16:creationId xmlns:a16="http://schemas.microsoft.com/office/drawing/2014/main" id="{E8076AE0-77A1-733B-C70C-BB6CC5ADF307}"/>
+              </a:ext>
+            </a:extLst>
+          </p:cNvPr>
+          <p:cNvPicPr>
+            <a:picLocks noChangeAspect="1"/>
+          </p:cNvPicPr>
+          <p:nvPr/>
+        </p:nvPicPr>
+        <p:blipFill>
+          <a:blip r:embed="rId3"/>
+          <a:stretch>
+            <a:fillRect/>
+          </a:stretch>
+        </p:blipFill>
+        <p:spPr>
+          <a:xfrm>
+            <a:off x="5567217" y="3628400"/>
+            <a:ext cx="6621608" cy="3229600"/>
+          </a:xfrm>
+          <a:prstGeom prst="rect">
+            <a:avLst/>
+          </a:prstGeom>
+        </p:spPr>
+      </p:pic>
+    </p:spTree>
+    <p:extLst>
+      <p:ext uri="{BB962C8B-B14F-4D97-AF65-F5344CB8AC3E}">
+        <p14:creationId xmlns:p14="http://schemas.microsoft.com/office/powerpoint/2010/main" val="3614341483"/>
+      </p:ext>
+    </p:extLst>
+  </p:cSld>
+  <p:clrMapOvr>
+    <a:masterClrMapping/>
+  </p:clrMapOvr>
+  <mc:AlternateContent xmlns:mc="http://schemas.openxmlformats.org/markup-compatibility/2006" xmlns:p14="http://schemas.microsoft.com/office/powerpoint/2010/main">
+    <mc:Choice Requires="p14">
+      <p:transition spd="med" p14:dur="700">
+        <p:fade/>
+      </p:transition>
+    </mc:Choice>
+    <mc:Fallback xmlns="">
+      <p:transition spd="med">
+        <p:fade/>
+      </p:transition>
+    </mc:Fallback>
+  </mc:AlternateContent>
+</p:sld>
+</file>
+
+<file path=ppt/slides/slide11.xml><?xml version="1.0" encoding="utf-8"?>
+<p:sld xmlns:a="http://schemas.openxmlformats.org/drawingml/2006/main" xmlns:r="http://schemas.openxmlformats.org/officeDocument/2006/relationships" xmlns:p="http://schemas.openxmlformats.org/presentationml/2006/main">
+  <p:cSld>
+    <p:spTree>
+      <p:nvGrpSpPr>
+        <p:cNvPr id="1" name=""/>
+        <p:cNvGrpSpPr/>
+        <p:nvPr/>
+      </p:nvGrpSpPr>
+      <p:grpSpPr>
+        <a:xfrm>
+          <a:off x="0" y="0"/>
+          <a:ext cx="0" cy="0"/>
+          <a:chOff x="0" y="0"/>
+          <a:chExt cx="0" cy="0"/>
+        </a:xfrm>
+      </p:grpSpPr>
+      <p:sp>
+        <p:nvSpPr>
+          <p:cNvPr id="2" name="Title 1"/>
+          <p:cNvSpPr>
+            <a:spLocks noGrp="1"/>
+          </p:cNvSpPr>
+          <p:nvPr>
+            <p:ph type="title"/>
+          </p:nvPr>
+        </p:nvSpPr>
+        <p:spPr/>
+        <p:txBody>
+          <a:bodyPr/>
+          <a:lstStyle/>
+          <a:p>
+            <a:endParaRPr lang="en-US" dirty="0"/>
+          </a:p>
+        </p:txBody>
+      </p:sp>
+      <p:pic>
+        <p:nvPicPr>
+          <p:cNvPr id="5" name="Content Placeholder 4" descr="A white text on a red background&#10;&#10;Description automatically generated">
+            <a:extLst>
+              <a:ext uri="{FF2B5EF4-FFF2-40B4-BE49-F238E27FC236}">
+                <a16:creationId xmlns:a16="http://schemas.microsoft.com/office/drawing/2014/main" id="{7B8D8CB4-A90E-C4DC-3A07-2C1BAA0EEB7C}"/>
+              </a:ext>
+            </a:extLst>
+          </p:cNvPr>
+          <p:cNvPicPr>
+            <a:picLocks noGrp="1" noChangeAspect="1"/>
+          </p:cNvPicPr>
+          <p:nvPr>
+            <p:ph idx="1"/>
+          </p:nvPr>
+        </p:nvPicPr>
+        <p:blipFill>
+          <a:blip r:embed="rId2">
+            <a:extLst>
+              <a:ext uri="{28A0092B-C50C-407E-A947-70E740481C1C}">
+                <a14:useLocalDpi xmlns:a14="http://schemas.microsoft.com/office/drawing/2010/main" val="0"/>
+              </a:ext>
+            </a:extLst>
+          </a:blip>
+          <a:stretch>
+            <a:fillRect/>
+          </a:stretch>
+        </p:blipFill>
+        <p:spPr>
+          <a:xfrm>
+            <a:off x="-170284" y="-1177224"/>
+            <a:ext cx="12287100" cy="9212447"/>
+          </a:xfrm>
+        </p:spPr>
+      </p:pic>
+    </p:spTree>
+    <p:extLst>
+      <p:ext uri="{BB962C8B-B14F-4D97-AF65-F5344CB8AC3E}">
+        <p14:creationId xmlns:p14="http://schemas.microsoft.com/office/powerpoint/2010/main" val="4259246236"/>
+      </p:ext>
+    </p:extLst>
+  </p:cSld>
+  <p:clrMapOvr>
+    <a:masterClrMapping/>
+  </p:clrMapOvr>
+  <mc:AlternateContent xmlns:mc="http://schemas.openxmlformats.org/markup-compatibility/2006" xmlns:p14="http://schemas.microsoft.com/office/powerpoint/2010/main">
+    <mc:Choice Requires="p14">
+      <p:transition spd="med" p14:dur="700">
+        <p:fade/>
+      </p:transition>
+    </mc:Choice>
+    <mc:Fallback xmlns="">
+      <p:transition spd="med">
+        <p:fade/>
+      </p:transition>
+    </mc:Fallback>
+  </mc:AlternateContent>
+</p:sld>
+</file>
+
 <file path=ppt/slides/slide2.xml><?xml version="1.0" encoding="utf-8"?>
 <p:sld xmlns:a="http://schemas.openxmlformats.org/drawingml/2006/main" xmlns:r="http://schemas.openxmlformats.org/officeDocument/2006/relationships" xmlns:p="http://schemas.openxmlformats.org/presentationml/2006/main">
   <p:cSld>
@@ -4272,6 +4508,14 @@
               <a:rPr lang="sr-Latn-RS" dirty="0"/>
               <a:t>EventInfo</a:t>
             </a:r>
+            <a:endParaRPr lang="en-US" dirty="0"/>
+          </a:p>
+          <a:p>
+            <a:r>
+              <a:rPr lang="en-US" dirty="0"/>
+              <a:t>Docker</a:t>
+            </a:r>
+            <a:endParaRPr lang="sr-Latn-RS" dirty="0"/>
           </a:p>
           <a:p>
             <a:r>
@@ -4352,35 +4596,6 @@
       </p:sp>
       <p:pic>
         <p:nvPicPr>
-          <p:cNvPr id="21" name="Content Placeholder 20">
-            <a:extLst>
-              <a:ext uri="{FF2B5EF4-FFF2-40B4-BE49-F238E27FC236}">
-                <a16:creationId xmlns:a16="http://schemas.microsoft.com/office/drawing/2014/main" id="{1C1E63E3-B2BC-3A03-6892-BE926E588537}"/>
-              </a:ext>
-            </a:extLst>
-          </p:cNvPr>
-          <p:cNvPicPr>
-            <a:picLocks noGrp="1" noChangeAspect="1"/>
-          </p:cNvPicPr>
-          <p:nvPr>
-            <p:ph idx="1"/>
-          </p:nvPr>
-        </p:nvPicPr>
-        <p:blipFill>
-          <a:blip r:embed="rId2"/>
-          <a:stretch>
-            <a:fillRect/>
-          </a:stretch>
-        </p:blipFill>
-        <p:spPr>
-          <a:xfrm>
-            <a:off x="793158" y="1908394"/>
-            <a:ext cx="5088238" cy="2502974"/>
-          </a:xfrm>
-        </p:spPr>
-      </p:pic>
-      <p:pic>
-        <p:nvPicPr>
           <p:cNvPr id="5" name="Graphic 4" descr="Database with solid fill">
             <a:extLst>
               <a:ext uri="{FF2B5EF4-FFF2-40B4-BE49-F238E27FC236}">
@@ -4394,13 +4609,13 @@
           <p:nvPr/>
         </p:nvPicPr>
         <p:blipFill>
-          <a:blip r:embed="rId3">
+          <a:blip r:embed="rId2">
             <a:extLst>
               <a:ext uri="{28A0092B-C50C-407E-A947-70E740481C1C}">
                 <a14:useLocalDpi xmlns:a14="http://schemas.microsoft.com/office/drawing/2010/main" val="0"/>
               </a:ext>
               <a:ext uri="{96DAC541-7B7A-43D3-8B79-37D633B846F1}">
-                <asvg:svgBlip xmlns:asvg="http://schemas.microsoft.com/office/drawing/2016/SVG/main" r:embed="rId4"/>
+                <asvg:svgBlip xmlns:asvg="http://schemas.microsoft.com/office/drawing/2016/SVG/main" r:embed="rId3"/>
               </a:ext>
             </a:extLst>
           </a:blip>
@@ -4487,13 +4702,13 @@
           <p:nvPr/>
         </p:nvPicPr>
         <p:blipFill>
-          <a:blip r:embed="rId5" cstate="print">
+          <a:blip r:embed="rId4" cstate="print">
             <a:extLst>
               <a:ext uri="{28A0092B-C50C-407E-A947-70E740481C1C}">
                 <a14:useLocalDpi xmlns:a14="http://schemas.microsoft.com/office/drawing/2010/main" val="0"/>
               </a:ext>
               <a:ext uri="{837473B0-CC2E-450A-ABE3-18F120FF3D39}">
-                <a1611:picAttrSrcUrl xmlns:a1611="http://schemas.microsoft.com/office/drawing/2016/11/main" r:id="rId6"/>
+                <a1611:picAttrSrcUrl xmlns:a1611="http://schemas.microsoft.com/office/drawing/2016/11/main" r:id="rId5"/>
               </a:ext>
             </a:extLst>
           </a:blip>
@@ -4526,13 +4741,13 @@
           <p:nvPr/>
         </p:nvPicPr>
         <p:blipFill>
-          <a:blip r:embed="rId7">
+          <a:blip r:embed="rId6">
             <a:extLst>
               <a:ext uri="{28A0092B-C50C-407E-A947-70E740481C1C}">
                 <a14:useLocalDpi xmlns:a14="http://schemas.microsoft.com/office/drawing/2010/main" val="0"/>
               </a:ext>
               <a:ext uri="{96DAC541-7B7A-43D3-8B79-37D633B846F1}">
-                <asvg:svgBlip xmlns:asvg="http://schemas.microsoft.com/office/drawing/2016/SVG/main" r:embed="rId8"/>
+                <asvg:svgBlip xmlns:asvg="http://schemas.microsoft.com/office/drawing/2016/SVG/main" r:embed="rId7"/>
               </a:ext>
             </a:extLst>
           </a:blip>
@@ -4565,13 +4780,13 @@
           <p:nvPr/>
         </p:nvPicPr>
         <p:blipFill>
-          <a:blip r:embed="rId9" cstate="print">
+          <a:blip r:embed="rId8" cstate="print">
             <a:extLst>
               <a:ext uri="{28A0092B-C50C-407E-A947-70E740481C1C}">
                 <a14:useLocalDpi xmlns:a14="http://schemas.microsoft.com/office/drawing/2010/main" val="0"/>
               </a:ext>
               <a:ext uri="{96DAC541-7B7A-43D3-8B79-37D633B846F1}">
-                <asvg:svgBlip xmlns:asvg="http://schemas.microsoft.com/office/drawing/2016/SVG/main" r:embed="rId10"/>
+                <asvg:svgBlip xmlns:asvg="http://schemas.microsoft.com/office/drawing/2016/SVG/main" r:embed="rId9"/>
               </a:ext>
             </a:extLst>
           </a:blip>
@@ -4603,8 +4818,8 @@
         </p:nvSpPr>
         <p:spPr>
           <a:xfrm>
-            <a:off x="7528182" y="2852104"/>
-            <a:ext cx="1918840" cy="307777"/>
+            <a:off x="7534572" y="2848856"/>
+            <a:ext cx="1912450" cy="307777"/>
           </a:xfrm>
           <a:prstGeom prst="rect">
             <a:avLst/>
@@ -4645,13 +4860,13 @@
           <p:nvPr/>
         </p:nvPicPr>
         <p:blipFill>
-          <a:blip r:embed="rId7">
+          <a:blip r:embed="rId6">
             <a:extLst>
               <a:ext uri="{28A0092B-C50C-407E-A947-70E740481C1C}">
                 <a14:useLocalDpi xmlns:a14="http://schemas.microsoft.com/office/drawing/2010/main" val="0"/>
               </a:ext>
               <a:ext uri="{96DAC541-7B7A-43D3-8B79-37D633B846F1}">
-                <asvg:svgBlip xmlns:asvg="http://schemas.microsoft.com/office/drawing/2016/SVG/main" r:embed="rId8"/>
+                <asvg:svgBlip xmlns:asvg="http://schemas.microsoft.com/office/drawing/2016/SVG/main" r:embed="rId7"/>
               </a:ext>
             </a:extLst>
           </a:blip>
@@ -4710,6 +4925,71 @@
           </a:p>
         </p:txBody>
       </p:sp>
+      <p:sp>
+        <p:nvSpPr>
+          <p:cNvPr id="4" name="Content Placeholder 3">
+            <a:extLst>
+              <a:ext uri="{FF2B5EF4-FFF2-40B4-BE49-F238E27FC236}">
+                <a16:creationId xmlns:a16="http://schemas.microsoft.com/office/drawing/2014/main" id="{06F72853-FB8E-0AA5-E196-AEC64472D8AF}"/>
+              </a:ext>
+            </a:extLst>
+          </p:cNvPr>
+          <p:cNvSpPr>
+            <a:spLocks noGrp="1"/>
+          </p:cNvSpPr>
+          <p:nvPr>
+            <p:ph idx="1"/>
+          </p:nvPr>
+        </p:nvSpPr>
+        <p:spPr>
+          <a:xfrm flipH="1">
+            <a:off x="10846938" y="6571061"/>
+            <a:ext cx="45719" cy="45719"/>
+          </a:xfrm>
+        </p:spPr>
+        <p:txBody>
+          <a:bodyPr>
+            <a:normAutofit fontScale="25000" lnSpcReduction="20000"/>
+          </a:bodyPr>
+          <a:lstStyle/>
+          <a:p>
+            <a:pPr marL="45720" indent="0">
+              <a:buNone/>
+            </a:pPr>
+            <a:endParaRPr lang="en-CH" dirty="0"/>
+          </a:p>
+        </p:txBody>
+      </p:sp>
+      <p:pic>
+        <p:nvPicPr>
+          <p:cNvPr id="8" name="Picture 7">
+            <a:extLst>
+              <a:ext uri="{FF2B5EF4-FFF2-40B4-BE49-F238E27FC236}">
+                <a16:creationId xmlns:a16="http://schemas.microsoft.com/office/drawing/2014/main" id="{E8A6CA8D-766C-2E58-0AED-FA9ECD6524DF}"/>
+              </a:ext>
+            </a:extLst>
+          </p:cNvPr>
+          <p:cNvPicPr>
+            <a:picLocks noChangeAspect="1"/>
+          </p:cNvPicPr>
+          <p:nvPr/>
+        </p:nvPicPr>
+        <p:blipFill>
+          <a:blip r:embed="rId10"/>
+          <a:stretch>
+            <a:fillRect/>
+          </a:stretch>
+        </p:blipFill>
+        <p:spPr>
+          <a:xfrm>
+            <a:off x="765819" y="1726924"/>
+            <a:ext cx="5197779" cy="3937711"/>
+          </a:xfrm>
+          <a:prstGeom prst="rect">
+            <a:avLst/>
+          </a:prstGeom>
+        </p:spPr>
+      </p:pic>
     </p:spTree>
     <p:extLst>
       <p:ext uri="{BB962C8B-B14F-4D97-AF65-F5344CB8AC3E}">
@@ -4774,31 +5054,381 @@
           </a:p>
         </p:txBody>
       </p:sp>
-      <p:sp>
-        <p:nvSpPr>
-          <p:cNvPr id="3" name="Content Placeholder 2"/>
-          <p:cNvSpPr>
-            <a:spLocks noGrp="1"/>
-          </p:cNvSpPr>
+      <p:pic>
+        <p:nvPicPr>
+          <p:cNvPr id="9" name="Content Placeholder 8">
+            <a:extLst>
+              <a:ext uri="{FF2B5EF4-FFF2-40B4-BE49-F238E27FC236}">
+                <a16:creationId xmlns:a16="http://schemas.microsoft.com/office/drawing/2014/main" id="{95E01B4A-B999-B8FF-2DB3-7D0567C56C65}"/>
+              </a:ext>
+            </a:extLst>
+          </p:cNvPr>
+          <p:cNvPicPr>
+            <a:picLocks noGrp="1" noChangeAspect="1"/>
+          </p:cNvPicPr>
           <p:nvPr>
             <p:ph idx="1"/>
           </p:nvPr>
-        </p:nvSpPr>
-        <p:spPr/>
-        <p:txBody>
-          <a:bodyPr/>
+        </p:nvPicPr>
+        <p:blipFill>
+          <a:blip r:embed="rId2"/>
+          <a:stretch>
+            <a:fillRect/>
+          </a:stretch>
+        </p:blipFill>
+        <p:spPr>
+          <a:xfrm>
+            <a:off x="1762221" y="1710020"/>
+            <a:ext cx="5484786" cy="1718980"/>
+          </a:xfrm>
+        </p:spPr>
+      </p:pic>
+      <p:pic>
+        <p:nvPicPr>
+          <p:cNvPr id="6" name="Picture 5" descr="A blue and yellow snake logo&#10;&#10;Description automatically generated">
+            <a:extLst>
+              <a:ext uri="{FF2B5EF4-FFF2-40B4-BE49-F238E27FC236}">
+                <a16:creationId xmlns:a16="http://schemas.microsoft.com/office/drawing/2014/main" id="{C6C28DE7-1AB1-A9A2-BA49-66A050A347CE}"/>
+              </a:ext>
+            </a:extLst>
+          </p:cNvPr>
+          <p:cNvPicPr>
+            <a:picLocks noChangeAspect="1"/>
+          </p:cNvPicPr>
+          <p:nvPr/>
+        </p:nvPicPr>
+        <p:blipFill>
+          <a:blip r:embed="rId3" cstate="print">
+            <a:extLst>
+              <a:ext uri="{28A0092B-C50C-407E-A947-70E740481C1C}">
+                <a14:useLocalDpi xmlns:a14="http://schemas.microsoft.com/office/drawing/2010/main" val="0"/>
+              </a:ext>
+              <a:ext uri="{837473B0-CC2E-450A-ABE3-18F120FF3D39}">
+                <a1611:picAttrSrcUrl xmlns:a1611="http://schemas.microsoft.com/office/drawing/2016/11/main" r:id="rId4"/>
+              </a:ext>
+            </a:extLst>
+          </a:blip>
+          <a:stretch>
+            <a:fillRect/>
+          </a:stretch>
+        </p:blipFill>
+        <p:spPr>
+          <a:xfrm>
+            <a:off x="8686700" y="611862"/>
+            <a:ext cx="1974745" cy="1974745"/>
+          </a:xfrm>
+          <a:prstGeom prst="rect">
+            <a:avLst/>
+          </a:prstGeom>
+        </p:spPr>
+      </p:pic>
+      <p:sp>
+        <p:nvSpPr>
+          <p:cNvPr id="7" name="Flowchart: Connector 6">
+            <a:extLst>
+              <a:ext uri="{FF2B5EF4-FFF2-40B4-BE49-F238E27FC236}">
+                <a16:creationId xmlns:a16="http://schemas.microsoft.com/office/drawing/2014/main" id="{E3460548-B2E8-CCAC-2A56-CB8BB8C6B926}"/>
+              </a:ext>
+            </a:extLst>
+          </p:cNvPr>
+          <p:cNvSpPr/>
+          <p:nvPr/>
+        </p:nvSpPr>
+        <p:spPr>
+          <a:xfrm>
+            <a:off x="8830716" y="4305258"/>
+            <a:ext cx="2046753" cy="2019342"/>
+          </a:xfrm>
+          <a:prstGeom prst="flowChartConnector">
+            <a:avLst/>
+          </a:prstGeom>
+          <a:solidFill>
+            <a:srgbClr val="FF9933"/>
+          </a:solidFill>
+          <a:ln>
+            <a:noFill/>
+          </a:ln>
+        </p:spPr>
+        <p:style>
+          <a:lnRef idx="1">
+            <a:schemeClr val="accent2"/>
+          </a:lnRef>
+          <a:fillRef idx="2">
+            <a:schemeClr val="accent2"/>
+          </a:fillRef>
+          <a:effectRef idx="1">
+            <a:schemeClr val="accent2"/>
+          </a:effectRef>
+          <a:fontRef idx="minor">
+            <a:schemeClr val="dk1"/>
+          </a:fontRef>
+        </p:style>
+        <p:txBody>
+          <a:bodyPr rtlCol="0" anchor="ctr"/>
           <a:lstStyle/>
           <a:p>
+            <a:pPr algn="ctr"/>
             <a:r>
               <a:rPr lang="en-US" dirty="0"/>
-              <a:t>Summary of the current situation.</a:t>
-            </a:r>
-          </a:p>
-          <a:p>
+              <a:t>MQTT</a:t>
+            </a:r>
+          </a:p>
+          <a:p>
+            <a:pPr algn="ctr"/>
             <a:r>
               <a:rPr lang="en-US" dirty="0"/>
-              <a:t>Use brief bullets, discuss details verbally.</a:t>
-            </a:r>
+              <a:t>Broker</a:t>
+            </a:r>
+            <a:endParaRPr lang="en-CH" dirty="0"/>
+          </a:p>
+        </p:txBody>
+      </p:sp>
+      <p:pic>
+        <p:nvPicPr>
+          <p:cNvPr id="11" name="Picture 10">
+            <a:extLst>
+              <a:ext uri="{FF2B5EF4-FFF2-40B4-BE49-F238E27FC236}">
+                <a16:creationId xmlns:a16="http://schemas.microsoft.com/office/drawing/2014/main" id="{66E19EA5-0836-894F-C8FF-3BDCE16D637A}"/>
+              </a:ext>
+            </a:extLst>
+          </p:cNvPr>
+          <p:cNvPicPr>
+            <a:picLocks noChangeAspect="1"/>
+          </p:cNvPicPr>
+          <p:nvPr/>
+        </p:nvPicPr>
+        <p:blipFill>
+          <a:blip r:embed="rId5"/>
+          <a:stretch>
+            <a:fillRect/>
+          </a:stretch>
+        </p:blipFill>
+        <p:spPr>
+          <a:xfrm>
+            <a:off x="1749089" y="3626708"/>
+            <a:ext cx="5154601" cy="3042544"/>
+          </a:xfrm>
+          <a:prstGeom prst="rect">
+            <a:avLst/>
+          </a:prstGeom>
+        </p:spPr>
+      </p:pic>
+      <p:pic>
+        <p:nvPicPr>
+          <p:cNvPr id="13" name="Graphic 12" descr="Line arrow: Straight with solid fill">
+            <a:extLst>
+              <a:ext uri="{FF2B5EF4-FFF2-40B4-BE49-F238E27FC236}">
+                <a16:creationId xmlns:a16="http://schemas.microsoft.com/office/drawing/2014/main" id="{2D5FDB6A-369E-9330-25E0-750B321F0DB8}"/>
+              </a:ext>
+            </a:extLst>
+          </p:cNvPr>
+          <p:cNvPicPr>
+            <a:picLocks noChangeAspect="1"/>
+          </p:cNvPicPr>
+          <p:nvPr/>
+        </p:nvPicPr>
+        <p:blipFill>
+          <a:blip r:embed="rId6">
+            <a:extLst>
+              <a:ext uri="{28A0092B-C50C-407E-A947-70E740481C1C}">
+                <a14:useLocalDpi xmlns:a14="http://schemas.microsoft.com/office/drawing/2010/main" val="0"/>
+              </a:ext>
+              <a:ext uri="{96DAC541-7B7A-43D3-8B79-37D633B846F1}">
+                <asvg:svgBlip xmlns:asvg="http://schemas.microsoft.com/office/drawing/2016/SVG/main" r:embed="rId7"/>
+              </a:ext>
+            </a:extLst>
+          </a:blip>
+          <a:stretch>
+            <a:fillRect/>
+          </a:stretch>
+        </p:blipFill>
+        <p:spPr>
+          <a:xfrm rot="16200000">
+            <a:off x="8471678" y="2710130"/>
+            <a:ext cx="1895226" cy="1419145"/>
+          </a:xfrm>
+          <a:prstGeom prst="rect">
+            <a:avLst/>
+          </a:prstGeom>
+        </p:spPr>
+      </p:pic>
+      <p:sp>
+        <p:nvSpPr>
+          <p:cNvPr id="14" name="TextBox 13">
+            <a:extLst>
+              <a:ext uri="{FF2B5EF4-FFF2-40B4-BE49-F238E27FC236}">
+                <a16:creationId xmlns:a16="http://schemas.microsoft.com/office/drawing/2014/main" id="{C1D23F59-0EA9-01E2-90D3-C39373399F9E}"/>
+              </a:ext>
+            </a:extLst>
+          </p:cNvPr>
+          <p:cNvSpPr txBox="1"/>
+          <p:nvPr/>
+        </p:nvSpPr>
+        <p:spPr>
+          <a:xfrm>
+            <a:off x="8240555" y="2718601"/>
+            <a:ext cx="1099981" cy="523220"/>
+          </a:xfrm>
+          <a:prstGeom prst="rect">
+            <a:avLst/>
+          </a:prstGeom>
+          <a:noFill/>
+          <a:ln>
+            <a:solidFill>
+              <a:schemeClr val="bg2"/>
+            </a:solidFill>
+          </a:ln>
+        </p:spPr>
+        <p:txBody>
+          <a:bodyPr wrap="none" rtlCol="0" anchor="ctr" anchorCtr="1">
+            <a:spAutoFit/>
+          </a:bodyPr>
+          <a:lstStyle/>
+          <a:p>
+            <a:r>
+              <a:rPr lang="en-US" sz="1400" dirty="0"/>
+              <a:t>Subscribe </a:t>
+            </a:r>
+          </a:p>
+          <a:p>
+            <a:r>
+              <a:rPr lang="en-US" sz="1400" dirty="0"/>
+              <a:t>sensor/data</a:t>
+            </a:r>
+            <a:endParaRPr lang="en-CH" sz="1400" dirty="0"/>
+          </a:p>
+        </p:txBody>
+      </p:sp>
+      <p:pic>
+        <p:nvPicPr>
+          <p:cNvPr id="16" name="Graphic 15" descr="Line arrow: Straight with solid fill">
+            <a:extLst>
+              <a:ext uri="{FF2B5EF4-FFF2-40B4-BE49-F238E27FC236}">
+                <a16:creationId xmlns:a16="http://schemas.microsoft.com/office/drawing/2014/main" id="{8E614D71-B2EF-81B0-66C6-5D25C902090D}"/>
+              </a:ext>
+            </a:extLst>
+          </p:cNvPr>
+          <p:cNvPicPr>
+            <a:picLocks noChangeAspect="1"/>
+          </p:cNvPicPr>
+          <p:nvPr/>
+        </p:nvPicPr>
+        <p:blipFill>
+          <a:blip r:embed="rId6">
+            <a:extLst>
+              <a:ext uri="{28A0092B-C50C-407E-A947-70E740481C1C}">
+                <a14:useLocalDpi xmlns:a14="http://schemas.microsoft.com/office/drawing/2010/main" val="0"/>
+              </a:ext>
+              <a:ext uri="{96DAC541-7B7A-43D3-8B79-37D633B846F1}">
+                <asvg:svgBlip xmlns:asvg="http://schemas.microsoft.com/office/drawing/2016/SVG/main" r:embed="rId7"/>
+              </a:ext>
+            </a:extLst>
+          </a:blip>
+          <a:stretch>
+            <a:fillRect/>
+          </a:stretch>
+        </p:blipFill>
+        <p:spPr>
+          <a:xfrm rot="16200000">
+            <a:off x="9040839" y="2642399"/>
+            <a:ext cx="1823872" cy="1554606"/>
+          </a:xfrm>
+          <a:prstGeom prst="rect">
+            <a:avLst/>
+          </a:prstGeom>
+        </p:spPr>
+      </p:pic>
+      <p:sp>
+        <p:nvSpPr>
+          <p:cNvPr id="17" name="TextBox 16">
+            <a:extLst>
+              <a:ext uri="{FF2B5EF4-FFF2-40B4-BE49-F238E27FC236}">
+                <a16:creationId xmlns:a16="http://schemas.microsoft.com/office/drawing/2014/main" id="{423A2E78-195C-A270-92DA-3830D340F83C}"/>
+              </a:ext>
+            </a:extLst>
+          </p:cNvPr>
+          <p:cNvSpPr txBox="1"/>
+          <p:nvPr/>
+        </p:nvSpPr>
+        <p:spPr>
+          <a:xfrm>
+            <a:off x="10085784" y="2636914"/>
+            <a:ext cx="1029449" cy="523220"/>
+          </a:xfrm>
+          <a:prstGeom prst="rect">
+            <a:avLst/>
+          </a:prstGeom>
+          <a:noFill/>
+          <a:ln>
+            <a:solidFill>
+              <a:schemeClr val="bg2"/>
+            </a:solidFill>
+          </a:ln>
+        </p:spPr>
+        <p:txBody>
+          <a:bodyPr wrap="none" rtlCol="0" anchor="ctr" anchorCtr="1">
+            <a:spAutoFit/>
+          </a:bodyPr>
+          <a:lstStyle/>
+          <a:p>
+            <a:r>
+              <a:rPr lang="en-US" sz="1400" dirty="0"/>
+              <a:t>Publish</a:t>
+            </a:r>
+          </a:p>
+          <a:p>
+            <a:r>
+              <a:rPr lang="en-US" sz="1400" dirty="0"/>
+              <a:t>sensor/last</a:t>
+            </a:r>
+            <a:endParaRPr lang="en-CH" sz="1400" dirty="0"/>
+          </a:p>
+        </p:txBody>
+      </p:sp>
+      <p:sp>
+        <p:nvSpPr>
+          <p:cNvPr id="18" name="TextBox 17">
+            <a:extLst>
+              <a:ext uri="{FF2B5EF4-FFF2-40B4-BE49-F238E27FC236}">
+                <a16:creationId xmlns:a16="http://schemas.microsoft.com/office/drawing/2014/main" id="{69232D11-CA69-FD83-D3A9-3CDB3BC33E67}"/>
+              </a:ext>
+            </a:extLst>
+          </p:cNvPr>
+          <p:cNvSpPr txBox="1"/>
+          <p:nvPr/>
+        </p:nvSpPr>
+        <p:spPr>
+          <a:xfrm>
+            <a:off x="10197497" y="3525779"/>
+            <a:ext cx="1611339" cy="523220"/>
+          </a:xfrm>
+          <a:prstGeom prst="rect">
+            <a:avLst/>
+          </a:prstGeom>
+          <a:noFill/>
+          <a:ln>
+            <a:solidFill>
+              <a:schemeClr val="bg2"/>
+            </a:solidFill>
+          </a:ln>
+        </p:spPr>
+        <p:txBody>
+          <a:bodyPr wrap="none" rtlCol="0" anchor="ctr" anchorCtr="1">
+            <a:spAutoFit/>
+          </a:bodyPr>
+          <a:lstStyle/>
+          <a:p>
+            <a:r>
+              <a:rPr lang="en-US" sz="1400" dirty="0"/>
+              <a:t>Publish </a:t>
+            </a:r>
+          </a:p>
+          <a:p>
+            <a:r>
+              <a:rPr lang="en-US" sz="1400" dirty="0"/>
+              <a:t>Sensor/anomaly/+</a:t>
+            </a:r>
+            <a:endParaRPr lang="en-CH" sz="1400" dirty="0"/>
           </a:p>
         </p:txBody>
       </p:sp>
@@ -4867,31 +5497,12 @@
           </a:p>
         </p:txBody>
       </p:sp>
-      <p:sp>
-        <p:nvSpPr>
-          <p:cNvPr id="3" name="Content Placeholder 2"/>
-          <p:cNvSpPr>
-            <a:spLocks noGrp="1"/>
-          </p:cNvSpPr>
-          <p:nvPr>
-            <p:ph idx="1"/>
-          </p:nvPr>
-        </p:nvSpPr>
-        <p:spPr/>
-        <p:txBody>
-          <a:bodyPr/>
-          <a:lstStyle/>
-          <a:p>
-            <a:endParaRPr lang="en-US" dirty="0"/>
-          </a:p>
-        </p:txBody>
-      </p:sp>
       <p:pic>
         <p:nvPicPr>
-          <p:cNvPr id="5" name="Picture 4">
+          <p:cNvPr id="6" name="Picture 5">
             <a:extLst>
               <a:ext uri="{FF2B5EF4-FFF2-40B4-BE49-F238E27FC236}">
-                <a16:creationId xmlns:a16="http://schemas.microsoft.com/office/drawing/2014/main" id="{21F630C8-D87B-1978-6F63-76EDE8345C44}"/>
+                <a16:creationId xmlns:a16="http://schemas.microsoft.com/office/drawing/2014/main" id="{5EC881B4-0A9D-AAA0-3805-97BC4BA8F6E4}"/>
               </a:ext>
             </a:extLst>
           </p:cNvPr>
@@ -4908,8 +5519,38 @@
         </p:blipFill>
         <p:spPr>
           <a:xfrm>
-            <a:off x="1341884" y="2492896"/>
-            <a:ext cx="2876951" cy="1638529"/>
+            <a:off x="4963592" y="1828002"/>
+            <a:ext cx="6300830" cy="3826442"/>
+          </a:xfrm>
+          <a:prstGeom prst="rect">
+            <a:avLst/>
+          </a:prstGeom>
+        </p:spPr>
+      </p:pic>
+      <p:pic>
+        <p:nvPicPr>
+          <p:cNvPr id="8" name="Picture 7">
+            <a:extLst>
+              <a:ext uri="{FF2B5EF4-FFF2-40B4-BE49-F238E27FC236}">
+                <a16:creationId xmlns:a16="http://schemas.microsoft.com/office/drawing/2014/main" id="{1D086EA6-F07C-0AC1-95C2-66D71170BB9B}"/>
+              </a:ext>
+            </a:extLst>
+          </p:cNvPr>
+          <p:cNvPicPr>
+            <a:picLocks noChangeAspect="1"/>
+          </p:cNvPicPr>
+          <p:nvPr/>
+        </p:nvPicPr>
+        <p:blipFill>
+          <a:blip r:embed="rId3"/>
+          <a:stretch>
+            <a:fillRect/>
+          </a:stretch>
+        </p:blipFill>
+        <p:spPr>
+          <a:xfrm>
+            <a:off x="477788" y="1839690"/>
+            <a:ext cx="4353533" cy="2200582"/>
           </a:xfrm>
           <a:prstGeom prst="rect">
             <a:avLst/>
@@ -4960,7 +5601,13 @@
       </p:grpSpPr>
       <p:sp>
         <p:nvSpPr>
-          <p:cNvPr id="2" name="Title 1"/>
+          <p:cNvPr id="2" name="Title 1">
+            <a:extLst>
+              <a:ext uri="{FF2B5EF4-FFF2-40B4-BE49-F238E27FC236}">
+                <a16:creationId xmlns:a16="http://schemas.microsoft.com/office/drawing/2014/main" id="{870C4A5C-2A10-0639-5346-6744F1C42175}"/>
+              </a:ext>
+            </a:extLst>
+          </p:cNvPr>
           <p:cNvSpPr>
             <a:spLocks noGrp="1"/>
           </p:cNvSpPr>
@@ -4974,50 +5621,77 @@
           <a:lstStyle/>
           <a:p>
             <a:r>
-              <a:rPr lang="en-US" dirty="0"/>
-              <a:t>Docker</a:t>
-            </a:r>
-          </a:p>
-        </p:txBody>
-      </p:sp>
-      <p:sp>
-        <p:nvSpPr>
-          <p:cNvPr id="3" name="Content Placeholder 2"/>
-          <p:cNvSpPr>
-            <a:spLocks noGrp="1"/>
-          </p:cNvSpPr>
-          <p:nvPr>
-            <p:ph idx="1"/>
-          </p:nvPr>
-        </p:nvSpPr>
-        <p:spPr/>
-        <p:txBody>
-          <a:bodyPr/>
-          <a:lstStyle/>
-          <a:p>
-            <a:r>
-              <a:rPr lang="en-US" dirty="0"/>
-              <a:t>State the alternative strategies.</a:t>
-            </a:r>
-          </a:p>
-          <a:p>
-            <a:r>
-              <a:rPr lang="en-US" dirty="0"/>
-              <a:t>List advantages &amp; disadvantages of each.</a:t>
-            </a:r>
-          </a:p>
-          <a:p>
-            <a:r>
-              <a:rPr lang="en-US" dirty="0"/>
-              <a:t>State cost of each option.</a:t>
-            </a:r>
-          </a:p>
-        </p:txBody>
-      </p:sp>
+              <a:rPr lang="en-US" dirty="0" err="1"/>
+              <a:t>EventInfo</a:t>
+            </a:r>
+            <a:endParaRPr lang="en-CH" dirty="0"/>
+          </a:p>
+        </p:txBody>
+      </p:sp>
+      <p:pic>
+        <p:nvPicPr>
+          <p:cNvPr id="11" name="Picture 10">
+            <a:extLst>
+              <a:ext uri="{FF2B5EF4-FFF2-40B4-BE49-F238E27FC236}">
+                <a16:creationId xmlns:a16="http://schemas.microsoft.com/office/drawing/2014/main" id="{5CD1B79B-9151-5076-85AB-98E5B62089EE}"/>
+              </a:ext>
+            </a:extLst>
+          </p:cNvPr>
+          <p:cNvPicPr>
+            <a:picLocks noChangeAspect="1"/>
+          </p:cNvPicPr>
+          <p:nvPr/>
+        </p:nvPicPr>
+        <p:blipFill>
+          <a:blip r:embed="rId2"/>
+          <a:stretch>
+            <a:fillRect/>
+          </a:stretch>
+        </p:blipFill>
+        <p:spPr>
+          <a:xfrm>
+            <a:off x="1057904" y="1600200"/>
+            <a:ext cx="4504318" cy="4924902"/>
+          </a:xfrm>
+          <a:prstGeom prst="rect">
+            <a:avLst/>
+          </a:prstGeom>
+        </p:spPr>
+      </p:pic>
+      <p:pic>
+        <p:nvPicPr>
+          <p:cNvPr id="13" name="Picture 12">
+            <a:extLst>
+              <a:ext uri="{FF2B5EF4-FFF2-40B4-BE49-F238E27FC236}">
+                <a16:creationId xmlns:a16="http://schemas.microsoft.com/office/drawing/2014/main" id="{1EBDD0B6-605C-98CB-C5AB-FFC28E4F1445}"/>
+              </a:ext>
+            </a:extLst>
+          </p:cNvPr>
+          <p:cNvPicPr>
+            <a:picLocks noChangeAspect="1"/>
+          </p:cNvPicPr>
+          <p:nvPr/>
+        </p:nvPicPr>
+        <p:blipFill>
+          <a:blip r:embed="rId3"/>
+          <a:stretch>
+            <a:fillRect/>
+          </a:stretch>
+        </p:blipFill>
+        <p:spPr>
+          <a:xfrm>
+            <a:off x="5734372" y="1619147"/>
+            <a:ext cx="6144482" cy="4887007"/>
+          </a:xfrm>
+          <a:prstGeom prst="rect">
+            <a:avLst/>
+          </a:prstGeom>
+        </p:spPr>
+      </p:pic>
     </p:spTree>
     <p:extLst>
       <p:ext uri="{BB962C8B-B14F-4D97-AF65-F5344CB8AC3E}">
-        <p14:creationId xmlns:p14="http://schemas.microsoft.com/office/powerpoint/2010/main" val="1173429218"/>
+        <p14:creationId xmlns:p14="http://schemas.microsoft.com/office/powerpoint/2010/main" val="1358402765"/>
       </p:ext>
     </p:extLst>
   </p:cSld>
@@ -5058,7 +5732,13 @@
       </p:grpSpPr>
       <p:sp>
         <p:nvSpPr>
-          <p:cNvPr id="2" name="Title 1"/>
+          <p:cNvPr id="2" name="Title 1">
+            <a:extLst>
+              <a:ext uri="{FF2B5EF4-FFF2-40B4-BE49-F238E27FC236}">
+                <a16:creationId xmlns:a16="http://schemas.microsoft.com/office/drawing/2014/main" id="{33028B6D-1379-60C1-6033-4053EBEF697D}"/>
+              </a:ext>
+            </a:extLst>
+          </p:cNvPr>
           <p:cNvSpPr>
             <a:spLocks noGrp="1"/>
           </p:cNvSpPr>
@@ -5071,16 +5751,20 @@
           <a:bodyPr/>
           <a:lstStyle/>
           <a:p>
-            <a:endParaRPr lang="en-US" dirty="0"/>
+            <a:r>
+              <a:rPr lang="en-US" dirty="0" err="1"/>
+              <a:t>EventInfo</a:t>
+            </a:r>
+            <a:endParaRPr lang="en-CH" dirty="0"/>
           </a:p>
         </p:txBody>
       </p:sp>
       <p:pic>
         <p:nvPicPr>
-          <p:cNvPr id="5" name="Content Placeholder 4" descr="A white text on a red background&#10;&#10;Description automatically generated">
+          <p:cNvPr id="5" name="Content Placeholder 4">
             <a:extLst>
               <a:ext uri="{FF2B5EF4-FFF2-40B4-BE49-F238E27FC236}">
-                <a16:creationId xmlns:a16="http://schemas.microsoft.com/office/drawing/2014/main" id="{7B8D8CB4-A90E-C4DC-3A07-2C1BAA0EEB7C}"/>
+                <a16:creationId xmlns:a16="http://schemas.microsoft.com/office/drawing/2014/main" id="{6C490826-0626-683D-96AC-DFB6B587E6F4}"/>
               </a:ext>
             </a:extLst>
           </p:cNvPr>
@@ -5092,28 +5776,457 @@
           </p:nvPr>
         </p:nvPicPr>
         <p:blipFill>
-          <a:blip r:embed="rId2">
-            <a:extLst>
-              <a:ext uri="{28A0092B-C50C-407E-A947-70E740481C1C}">
-                <a14:useLocalDpi xmlns:a14="http://schemas.microsoft.com/office/drawing/2010/main" val="0"/>
-              </a:ext>
-            </a:extLst>
-          </a:blip>
+          <a:blip r:embed="rId2"/>
           <a:stretch>
             <a:fillRect/>
           </a:stretch>
         </p:blipFill>
         <p:spPr>
           <a:xfrm>
-            <a:off x="-170284" y="-1177224"/>
-            <a:ext cx="12287100" cy="9212447"/>
+            <a:off x="1047248" y="1916832"/>
+            <a:ext cx="3034145" cy="4191000"/>
           </a:xfrm>
         </p:spPr>
       </p:pic>
     </p:spTree>
     <p:extLst>
       <p:ext uri="{BB962C8B-B14F-4D97-AF65-F5344CB8AC3E}">
-        <p14:creationId xmlns:p14="http://schemas.microsoft.com/office/powerpoint/2010/main" val="4259246236"/>
+        <p14:creationId xmlns:p14="http://schemas.microsoft.com/office/powerpoint/2010/main" val="4283538831"/>
+      </p:ext>
+    </p:extLst>
+  </p:cSld>
+  <p:clrMapOvr>
+    <a:masterClrMapping/>
+  </p:clrMapOvr>
+  <mc:AlternateContent xmlns:mc="http://schemas.openxmlformats.org/markup-compatibility/2006" xmlns:p14="http://schemas.microsoft.com/office/powerpoint/2010/main">
+    <mc:Choice Requires="p14">
+      <p:transition spd="med" p14:dur="700">
+        <p:fade/>
+      </p:transition>
+    </mc:Choice>
+    <mc:Fallback xmlns="">
+      <p:transition spd="med">
+        <p:fade/>
+      </p:transition>
+    </mc:Fallback>
+  </mc:AlternateContent>
+</p:sld>
+</file>
+
+<file path=ppt/slides/slide8.xml><?xml version="1.0" encoding="utf-8"?>
+<p:sld xmlns:a="http://schemas.openxmlformats.org/drawingml/2006/main" xmlns:r="http://schemas.openxmlformats.org/officeDocument/2006/relationships" xmlns:p="http://schemas.openxmlformats.org/presentationml/2006/main">
+  <p:cSld>
+    <p:spTree>
+      <p:nvGrpSpPr>
+        <p:cNvPr id="1" name=""/>
+        <p:cNvGrpSpPr/>
+        <p:nvPr/>
+      </p:nvGrpSpPr>
+      <p:grpSpPr>
+        <a:xfrm>
+          <a:off x="0" y="0"/>
+          <a:ext cx="0" cy="0"/>
+          <a:chOff x="0" y="0"/>
+          <a:chExt cx="0" cy="0"/>
+        </a:xfrm>
+      </p:grpSpPr>
+      <p:sp>
+        <p:nvSpPr>
+          <p:cNvPr id="2" name="Title 1"/>
+          <p:cNvSpPr>
+            <a:spLocks noGrp="1"/>
+          </p:cNvSpPr>
+          <p:nvPr>
+            <p:ph type="title"/>
+          </p:nvPr>
+        </p:nvSpPr>
+        <p:spPr>
+          <a:xfrm>
+            <a:off x="972987" y="463438"/>
+            <a:ext cx="8686801" cy="1066800"/>
+          </a:xfrm>
+        </p:spPr>
+        <p:txBody>
+          <a:bodyPr/>
+          <a:lstStyle/>
+          <a:p>
+            <a:r>
+              <a:rPr lang="en-US" dirty="0"/>
+              <a:t>Docker</a:t>
+            </a:r>
+            <a:br>
+              <a:rPr lang="en-US" dirty="0"/>
+            </a:br>
+            <a:r>
+              <a:rPr lang="en-US" sz="2800" dirty="0" err="1"/>
+              <a:t>docker</a:t>
+            </a:r>
+            <a:r>
+              <a:rPr lang="en-US" sz="2800" dirty="0"/>
+              <a:t> images</a:t>
+            </a:r>
+            <a:endParaRPr lang="en-US" dirty="0"/>
+          </a:p>
+        </p:txBody>
+      </p:sp>
+      <p:pic>
+        <p:nvPicPr>
+          <p:cNvPr id="5" name="Picture 4">
+            <a:extLst>
+              <a:ext uri="{FF2B5EF4-FFF2-40B4-BE49-F238E27FC236}">
+                <a16:creationId xmlns:a16="http://schemas.microsoft.com/office/drawing/2014/main" id="{6ABEAF01-7561-FDDA-89AD-7D16D4CE6BE4}"/>
+              </a:ext>
+            </a:extLst>
+          </p:cNvPr>
+          <p:cNvPicPr>
+            <a:picLocks noChangeAspect="1"/>
+          </p:cNvPicPr>
+          <p:nvPr/>
+        </p:nvPicPr>
+        <p:blipFill>
+          <a:blip r:embed="rId2"/>
+          <a:stretch>
+            <a:fillRect/>
+          </a:stretch>
+        </p:blipFill>
+        <p:spPr>
+          <a:xfrm>
+            <a:off x="953329" y="2206338"/>
+            <a:ext cx="4363059" cy="1400370"/>
+          </a:xfrm>
+          <a:prstGeom prst="rect">
+            <a:avLst/>
+          </a:prstGeom>
+        </p:spPr>
+      </p:pic>
+      <p:pic>
+        <p:nvPicPr>
+          <p:cNvPr id="7" name="Picture 6">
+            <a:extLst>
+              <a:ext uri="{FF2B5EF4-FFF2-40B4-BE49-F238E27FC236}">
+                <a16:creationId xmlns:a16="http://schemas.microsoft.com/office/drawing/2014/main" id="{03CC31CB-AD96-88B0-2010-B82DFF30E11C}"/>
+              </a:ext>
+            </a:extLst>
+          </p:cNvPr>
+          <p:cNvPicPr>
+            <a:picLocks noChangeAspect="1"/>
+          </p:cNvPicPr>
+          <p:nvPr/>
+        </p:nvPicPr>
+        <p:blipFill>
+          <a:blip r:embed="rId3"/>
+          <a:stretch>
+            <a:fillRect/>
+          </a:stretch>
+        </p:blipFill>
+        <p:spPr>
+          <a:xfrm>
+            <a:off x="981476" y="4301601"/>
+            <a:ext cx="4601217" cy="1305107"/>
+          </a:xfrm>
+          <a:prstGeom prst="rect">
+            <a:avLst/>
+          </a:prstGeom>
+        </p:spPr>
+      </p:pic>
+      <p:pic>
+        <p:nvPicPr>
+          <p:cNvPr id="9" name="Picture 8">
+            <a:extLst>
+              <a:ext uri="{FF2B5EF4-FFF2-40B4-BE49-F238E27FC236}">
+                <a16:creationId xmlns:a16="http://schemas.microsoft.com/office/drawing/2014/main" id="{8DDF0504-E671-EC55-28E1-493979EBDD5F}"/>
+              </a:ext>
+            </a:extLst>
+          </p:cNvPr>
+          <p:cNvPicPr>
+            <a:picLocks noChangeAspect="1"/>
+          </p:cNvPicPr>
+          <p:nvPr/>
+        </p:nvPicPr>
+        <p:blipFill>
+          <a:blip r:embed="rId4"/>
+          <a:stretch>
+            <a:fillRect/>
+          </a:stretch>
+        </p:blipFill>
+        <p:spPr>
+          <a:xfrm>
+            <a:off x="7174532" y="3320219"/>
+            <a:ext cx="3480192" cy="1633936"/>
+          </a:xfrm>
+          <a:prstGeom prst="rect">
+            <a:avLst/>
+          </a:prstGeom>
+        </p:spPr>
+      </p:pic>
+      <p:sp>
+        <p:nvSpPr>
+          <p:cNvPr id="10" name="TextBox 9">
+            <a:extLst>
+              <a:ext uri="{FF2B5EF4-FFF2-40B4-BE49-F238E27FC236}">
+                <a16:creationId xmlns:a16="http://schemas.microsoft.com/office/drawing/2014/main" id="{ED71084E-A243-6214-2342-9D278D43AB75}"/>
+              </a:ext>
+            </a:extLst>
+          </p:cNvPr>
+          <p:cNvSpPr txBox="1"/>
+          <p:nvPr/>
+        </p:nvSpPr>
+        <p:spPr>
+          <a:xfrm>
+            <a:off x="1125860" y="1652340"/>
+            <a:ext cx="1659429" cy="369332"/>
+          </a:xfrm>
+          <a:prstGeom prst="rect">
+            <a:avLst/>
+          </a:prstGeom>
+          <a:noFill/>
+          <a:ln>
+            <a:solidFill>
+              <a:schemeClr val="bg2"/>
+            </a:solidFill>
+          </a:ln>
+        </p:spPr>
+        <p:txBody>
+          <a:bodyPr wrap="none" rtlCol="0" anchor="ctr" anchorCtr="1">
+            <a:spAutoFit/>
+          </a:bodyPr>
+          <a:lstStyle/>
+          <a:p>
+            <a:r>
+              <a:rPr lang="en-US" dirty="0"/>
+              <a:t>Python-sensor</a:t>
+            </a:r>
+            <a:endParaRPr lang="en-CH" dirty="0"/>
+          </a:p>
+        </p:txBody>
+      </p:sp>
+      <p:sp>
+        <p:nvSpPr>
+          <p:cNvPr id="11" name="TextBox 10">
+            <a:extLst>
+              <a:ext uri="{FF2B5EF4-FFF2-40B4-BE49-F238E27FC236}">
+                <a16:creationId xmlns:a16="http://schemas.microsoft.com/office/drawing/2014/main" id="{F12F65C8-456B-C7E8-792A-AD55BDBD5279}"/>
+              </a:ext>
+            </a:extLst>
+          </p:cNvPr>
+          <p:cNvSpPr txBox="1"/>
+          <p:nvPr/>
+        </p:nvSpPr>
+        <p:spPr>
+          <a:xfrm>
+            <a:off x="1025910" y="3932269"/>
+            <a:ext cx="1152880" cy="369332"/>
+          </a:xfrm>
+          <a:prstGeom prst="rect">
+            <a:avLst/>
+          </a:prstGeom>
+          <a:noFill/>
+          <a:ln>
+            <a:solidFill>
+              <a:schemeClr val="bg2"/>
+            </a:solidFill>
+          </a:ln>
+        </p:spPr>
+        <p:txBody>
+          <a:bodyPr wrap="none" rtlCol="0" anchor="ctr" anchorCtr="1">
+            <a:spAutoFit/>
+          </a:bodyPr>
+          <a:lstStyle/>
+          <a:p>
+            <a:r>
+              <a:rPr lang="en-US" dirty="0"/>
+              <a:t>Analytics</a:t>
+            </a:r>
+            <a:endParaRPr lang="en-CH" dirty="0"/>
+          </a:p>
+        </p:txBody>
+      </p:sp>
+      <p:sp>
+        <p:nvSpPr>
+          <p:cNvPr id="12" name="TextBox 11">
+            <a:extLst>
+              <a:ext uri="{FF2B5EF4-FFF2-40B4-BE49-F238E27FC236}">
+                <a16:creationId xmlns:a16="http://schemas.microsoft.com/office/drawing/2014/main" id="{97DFE756-4826-3E81-A958-CC93297B6D44}"/>
+              </a:ext>
+            </a:extLst>
+          </p:cNvPr>
+          <p:cNvSpPr txBox="1"/>
+          <p:nvPr/>
+        </p:nvSpPr>
+        <p:spPr>
+          <a:xfrm>
+            <a:off x="7534572" y="2190851"/>
+            <a:ext cx="1188980" cy="369332"/>
+          </a:xfrm>
+          <a:prstGeom prst="rect">
+            <a:avLst/>
+          </a:prstGeom>
+          <a:noFill/>
+          <a:ln>
+            <a:solidFill>
+              <a:schemeClr val="bg2"/>
+            </a:solidFill>
+          </a:ln>
+        </p:spPr>
+        <p:txBody>
+          <a:bodyPr wrap="none" rtlCol="0" anchor="ctr" anchorCtr="1">
+            <a:spAutoFit/>
+          </a:bodyPr>
+          <a:lstStyle/>
+          <a:p>
+            <a:r>
+              <a:rPr lang="en-US" dirty="0" err="1"/>
+              <a:t>EventInfo</a:t>
+            </a:r>
+            <a:endParaRPr lang="en-CH" dirty="0"/>
+          </a:p>
+        </p:txBody>
+      </p:sp>
+    </p:spTree>
+    <p:extLst>
+      <p:ext uri="{BB962C8B-B14F-4D97-AF65-F5344CB8AC3E}">
+        <p14:creationId xmlns:p14="http://schemas.microsoft.com/office/powerpoint/2010/main" val="1173429218"/>
+      </p:ext>
+    </p:extLst>
+  </p:cSld>
+  <p:clrMapOvr>
+    <a:masterClrMapping/>
+  </p:clrMapOvr>
+  <mc:AlternateContent xmlns:mc="http://schemas.openxmlformats.org/markup-compatibility/2006" xmlns:p14="http://schemas.microsoft.com/office/powerpoint/2010/main">
+    <mc:Choice Requires="p14">
+      <p:transition spd="med" p14:dur="700">
+        <p:fade/>
+      </p:transition>
+    </mc:Choice>
+    <mc:Fallback xmlns="">
+      <p:transition spd="med">
+        <p:fade/>
+      </p:transition>
+    </mc:Fallback>
+  </mc:AlternateContent>
+</p:sld>
+</file>
+
+<file path=ppt/slides/slide9.xml><?xml version="1.0" encoding="utf-8"?>
+<p:sld xmlns:a="http://schemas.openxmlformats.org/drawingml/2006/main" xmlns:r="http://schemas.openxmlformats.org/officeDocument/2006/relationships" xmlns:p="http://schemas.openxmlformats.org/presentationml/2006/main">
+  <p:cSld>
+    <p:spTree>
+      <p:nvGrpSpPr>
+        <p:cNvPr id="1" name=""/>
+        <p:cNvGrpSpPr/>
+        <p:nvPr/>
+      </p:nvGrpSpPr>
+      <p:grpSpPr>
+        <a:xfrm>
+          <a:off x="0" y="0"/>
+          <a:ext cx="0" cy="0"/>
+          <a:chOff x="0" y="0"/>
+          <a:chExt cx="0" cy="0"/>
+        </a:xfrm>
+      </p:grpSpPr>
+      <p:sp>
+        <p:nvSpPr>
+          <p:cNvPr id="2" name="Title 1">
+            <a:extLst>
+              <a:ext uri="{FF2B5EF4-FFF2-40B4-BE49-F238E27FC236}">
+                <a16:creationId xmlns:a16="http://schemas.microsoft.com/office/drawing/2014/main" id="{95EF29E1-1336-FC8E-289F-8C75CC93F28E}"/>
+              </a:ext>
+            </a:extLst>
+          </p:cNvPr>
+          <p:cNvSpPr>
+            <a:spLocks noGrp="1"/>
+          </p:cNvSpPr>
+          <p:nvPr>
+            <p:ph type="title"/>
+          </p:nvPr>
+        </p:nvSpPr>
+        <p:spPr/>
+        <p:txBody>
+          <a:bodyPr/>
+          <a:lstStyle/>
+          <a:p>
+            <a:r>
+              <a:rPr lang="en-US" dirty="0"/>
+              <a:t>Docker</a:t>
+            </a:r>
+            <a:br>
+              <a:rPr lang="en-US" dirty="0"/>
+            </a:br>
+            <a:r>
+              <a:rPr lang="en-US" sz="2800" dirty="0" err="1"/>
+              <a:t>docker</a:t>
+            </a:r>
+            <a:r>
+              <a:rPr lang="en-US" sz="2800" dirty="0"/>
+              <a:t> compose</a:t>
+            </a:r>
+            <a:endParaRPr lang="en-CH" dirty="0"/>
+          </a:p>
+        </p:txBody>
+      </p:sp>
+      <p:pic>
+        <p:nvPicPr>
+          <p:cNvPr id="5" name="Content Placeholder 4">
+            <a:extLst>
+              <a:ext uri="{FF2B5EF4-FFF2-40B4-BE49-F238E27FC236}">
+                <a16:creationId xmlns:a16="http://schemas.microsoft.com/office/drawing/2014/main" id="{E7DC80A3-8346-CF1C-688C-59A30DD51372}"/>
+              </a:ext>
+            </a:extLst>
+          </p:cNvPr>
+          <p:cNvPicPr>
+            <a:picLocks noGrp="1" noChangeAspect="1"/>
+          </p:cNvPicPr>
+          <p:nvPr>
+            <p:ph idx="1"/>
+          </p:nvPr>
+        </p:nvPicPr>
+        <p:blipFill>
+          <a:blip r:embed="rId2"/>
+          <a:stretch>
+            <a:fillRect/>
+          </a:stretch>
+        </p:blipFill>
+        <p:spPr>
+          <a:xfrm>
+            <a:off x="1550366" y="1772816"/>
+            <a:ext cx="3530021" cy="5025331"/>
+          </a:xfrm>
+        </p:spPr>
+      </p:pic>
+      <p:pic>
+        <p:nvPicPr>
+          <p:cNvPr id="9" name="Picture 8">
+            <a:extLst>
+              <a:ext uri="{FF2B5EF4-FFF2-40B4-BE49-F238E27FC236}">
+                <a16:creationId xmlns:a16="http://schemas.microsoft.com/office/drawing/2014/main" id="{37C3BC94-002F-AD7B-A9A9-657F233A0F05}"/>
+              </a:ext>
+            </a:extLst>
+          </p:cNvPr>
+          <p:cNvPicPr>
+            <a:picLocks noChangeAspect="1"/>
+          </p:cNvPicPr>
+          <p:nvPr/>
+        </p:nvPicPr>
+        <p:blipFill>
+          <a:blip r:embed="rId3"/>
+          <a:stretch>
+            <a:fillRect/>
+          </a:stretch>
+        </p:blipFill>
+        <p:spPr>
+          <a:xfrm>
+            <a:off x="5975968" y="1804824"/>
+            <a:ext cx="4164892" cy="5025331"/>
+          </a:xfrm>
+          <a:prstGeom prst="rect">
+            <a:avLst/>
+          </a:prstGeom>
+        </p:spPr>
+      </p:pic>
+    </p:spTree>
+    <p:extLst>
+      <p:ext uri="{BB962C8B-B14F-4D97-AF65-F5344CB8AC3E}">
+        <p14:creationId xmlns:p14="http://schemas.microsoft.com/office/powerpoint/2010/main" val="1005245644"/>
       </p:ext>
     </p:extLst>
   </p:cSld>

</xml_diff>

<commit_message>
readme updated, pdf file created
</commit_message>
<xml_diff>
--- a/Internet stvari i servisa2.pptx
+++ b/Internet stvari i servisa2.pptx
@@ -15,8 +15,8 @@
     <p:sldId id="258" r:id="rId3"/>
     <p:sldId id="259" r:id="rId4"/>
     <p:sldId id="260" r:id="rId5"/>
-    <p:sldId id="261" r:id="rId6"/>
-    <p:sldId id="264" r:id="rId7"/>
+    <p:sldId id="264" r:id="rId6"/>
+    <p:sldId id="261" r:id="rId7"/>
     <p:sldId id="265" r:id="rId8"/>
     <p:sldId id="262" r:id="rId9"/>
     <p:sldId id="266" r:id="rId10"/>
@@ -284,7 +284,7 @@
           <a:p>
             <a:fld id="{24CE221E-83ED-4F6C-BA5F-3F9E6FDB6953}" type="datetimeFigureOut">
               <a:rPr lang="en-US"/>
-              <a:t>5/29/2024</a:t>
+              <a:t>5/30/2024</a:t>
             </a:fld>
             <a:endParaRPr dirty="0"/>
           </a:p>
@@ -449,7 +449,7 @@
           <a:p>
             <a:fld id="{97853E5F-CE67-483C-A264-F17AC70E9CA2}" type="datetimeFigureOut">
               <a:rPr lang="en-US"/>
-              <a:t>5/29/2024</a:t>
+              <a:t>5/30/2024</a:t>
             </a:fld>
             <a:endParaRPr dirty="0"/>
           </a:p>
@@ -1041,7 +1041,7 @@
           <a:p>
             <a:fld id="{3E0FA9E5-6744-4841-888F-9E7CC0C2B7EC}" type="datetimeFigureOut">
               <a:rPr lang="en-US" smtClean="0"/>
-              <a:t>5/29/2024</a:t>
+              <a:t>5/30/2024</a:t>
             </a:fld>
             <a:endParaRPr lang="en-US" dirty="0"/>
           </a:p>
@@ -1231,7 +1231,7 @@
           <a:p>
             <a:fld id="{3E0FA9E5-6744-4841-888F-9E7CC0C2B7EC}" type="datetimeFigureOut">
               <a:rPr lang="en-US" smtClean="0"/>
-              <a:t>5/29/2024</a:t>
+              <a:t>5/30/2024</a:t>
             </a:fld>
             <a:endParaRPr lang="en-US" dirty="0"/>
           </a:p>
@@ -1426,7 +1426,7 @@
           <a:p>
             <a:fld id="{3E0FA9E5-6744-4841-888F-9E7CC0C2B7EC}" type="datetimeFigureOut">
               <a:rPr lang="en-US" smtClean="0"/>
-              <a:t>5/29/2024</a:t>
+              <a:t>5/30/2024</a:t>
             </a:fld>
             <a:endParaRPr lang="en-US" dirty="0"/>
           </a:p>
@@ -1611,7 +1611,7 @@
           <a:p>
             <a:fld id="{3E0FA9E5-6744-4841-888F-9E7CC0C2B7EC}" type="datetimeFigureOut">
               <a:rPr lang="en-US" smtClean="0"/>
-              <a:t>5/29/2024</a:t>
+              <a:t>5/30/2024</a:t>
             </a:fld>
             <a:endParaRPr lang="en-US" dirty="0"/>
           </a:p>
@@ -1880,7 +1880,7 @@
           <a:p>
             <a:fld id="{3E0FA9E5-6744-4841-888F-9E7CC0C2B7EC}" type="datetimeFigureOut">
               <a:rPr lang="en-US" smtClean="0"/>
-              <a:t>5/29/2024</a:t>
+              <a:t>5/30/2024</a:t>
             </a:fld>
             <a:endParaRPr lang="en-US" dirty="0"/>
           </a:p>
@@ -2187,7 +2187,7 @@
           <a:p>
             <a:fld id="{3E0FA9E5-6744-4841-888F-9E7CC0C2B7EC}" type="datetimeFigureOut">
               <a:rPr lang="en-US" smtClean="0"/>
-              <a:t>5/29/2024</a:t>
+              <a:t>5/30/2024</a:t>
             </a:fld>
             <a:endParaRPr lang="en-US" dirty="0"/>
           </a:p>
@@ -2643,7 +2643,7 @@
           <a:p>
             <a:fld id="{3E0FA9E5-6744-4841-888F-9E7CC0C2B7EC}" type="datetimeFigureOut">
               <a:rPr lang="en-US" smtClean="0"/>
-              <a:t>5/29/2024</a:t>
+              <a:t>5/30/2024</a:t>
             </a:fld>
             <a:endParaRPr lang="en-US" dirty="0"/>
           </a:p>
@@ -2776,7 +2776,7 @@
           <a:p>
             <a:fld id="{3E0FA9E5-6744-4841-888F-9E7CC0C2B7EC}" type="datetimeFigureOut">
               <a:rPr lang="en-US" smtClean="0"/>
-              <a:t>5/29/2024</a:t>
+              <a:t>5/30/2024</a:t>
             </a:fld>
             <a:endParaRPr lang="en-US" dirty="0"/>
           </a:p>
@@ -2886,7 +2886,7 @@
           <a:p>
             <a:fld id="{3E0FA9E5-6744-4841-888F-9E7CC0C2B7EC}" type="datetimeFigureOut">
               <a:rPr lang="en-US" smtClean="0"/>
-              <a:t>5/29/2024</a:t>
+              <a:t>5/30/2024</a:t>
             </a:fld>
             <a:endParaRPr lang="en-US" dirty="0"/>
           </a:p>
@@ -3197,7 +3197,7 @@
           <a:p>
             <a:fld id="{3E0FA9E5-6744-4841-888F-9E7CC0C2B7EC}" type="datetimeFigureOut">
               <a:rPr lang="en-US" smtClean="0"/>
-              <a:t>5/29/2024</a:t>
+              <a:t>5/30/2024</a:t>
             </a:fld>
             <a:endParaRPr lang="en-US" dirty="0"/>
           </a:p>
@@ -3674,7 +3674,7 @@
             <a:fld id="{3E0FA9E5-6744-4841-888F-9E7CC0C2B7EC}" type="datetimeFigureOut">
               <a:rPr lang="en-US" smtClean="0"/>
               <a:pPr/>
-              <a:t>5/29/2024</a:t>
+              <a:t>5/30/2024</a:t>
             </a:fld>
             <a:endParaRPr lang="en-US" dirty="0"/>
           </a:p>
@@ -4407,8 +4407,8 @@
         </p:blipFill>
         <p:spPr>
           <a:xfrm>
-            <a:off x="-170284" y="-1177224"/>
-            <a:ext cx="12287100" cy="9212447"/>
+            <a:off x="-170285" y="-1177224"/>
+            <a:ext cx="12359109" cy="9212447"/>
           </a:xfrm>
         </p:spPr>
       </p:pic>
@@ -4925,41 +4925,44 @@
           </a:p>
         </p:txBody>
       </p:sp>
-      <p:sp>
-        <p:nvSpPr>
-          <p:cNvPr id="4" name="Content Placeholder 3">
+      <p:pic>
+        <p:nvPicPr>
+          <p:cNvPr id="7" name="Content Placeholder 6" descr="Line arrow: Straight outline">
             <a:extLst>
               <a:ext uri="{FF2B5EF4-FFF2-40B4-BE49-F238E27FC236}">
-                <a16:creationId xmlns:a16="http://schemas.microsoft.com/office/drawing/2014/main" id="{06F72853-FB8E-0AA5-E196-AEC64472D8AF}"/>
+                <a16:creationId xmlns:a16="http://schemas.microsoft.com/office/drawing/2014/main" id="{B053C712-90BD-36AB-0AB1-B68C06FF4389}"/>
               </a:ext>
             </a:extLst>
           </p:cNvPr>
-          <p:cNvSpPr>
-            <a:spLocks noGrp="1"/>
-          </p:cNvSpPr>
+          <p:cNvPicPr>
+            <a:picLocks noGrp="1" noChangeAspect="1"/>
+          </p:cNvPicPr>
           <p:nvPr>
             <p:ph idx="1"/>
           </p:nvPr>
-        </p:nvSpPr>
+        </p:nvPicPr>
+        <p:blipFill>
+          <a:blip r:embed="rId10" cstate="print">
+            <a:extLst>
+              <a:ext uri="{28A0092B-C50C-407E-A947-70E740481C1C}">
+                <a14:useLocalDpi xmlns:a14="http://schemas.microsoft.com/office/drawing/2010/main" val="0"/>
+              </a:ext>
+              <a:ext uri="{96DAC541-7B7A-43D3-8B79-37D633B846F1}">
+                <asvg:svgBlip xmlns:asvg="http://schemas.microsoft.com/office/drawing/2016/SVG/main" r:embed="rId11"/>
+              </a:ext>
+            </a:extLst>
+          </a:blip>
+          <a:stretch>
+            <a:fillRect/>
+          </a:stretch>
+        </p:blipFill>
         <p:spPr>
           <a:xfrm flipH="1">
-            <a:off x="10846938" y="6571061"/>
-            <a:ext cx="45719" cy="45719"/>
-          </a:xfrm>
-        </p:spPr>
-        <p:txBody>
-          <a:bodyPr>
-            <a:normAutofit fontScale="25000" lnSpcReduction="20000"/>
-          </a:bodyPr>
-          <a:lstStyle/>
-          <a:p>
-            <a:pPr marL="45720" indent="0">
-              <a:buNone/>
-            </a:pPr>
-            <a:endParaRPr lang="en-CH" dirty="0"/>
-          </a:p>
-        </p:txBody>
-      </p:sp>
+            <a:off x="10847388" y="6570663"/>
+            <a:ext cx="46037" cy="46037"/>
+          </a:xfrm>
+        </p:spPr>
+      </p:pic>
       <p:pic>
         <p:nvPicPr>
           <p:cNvPr id="8" name="Picture 7">
@@ -4975,7 +4978,7 @@
           <p:nvPr/>
         </p:nvPicPr>
         <p:blipFill>
-          <a:blip r:embed="rId10"/>
+          <a:blip r:embed="rId12"/>
           <a:stretch>
             <a:fillRect/>
           </a:stretch>
@@ -4984,6 +4987,45 @@
           <a:xfrm>
             <a:off x="765819" y="1726924"/>
             <a:ext cx="5197779" cy="3937711"/>
+          </a:xfrm>
+          <a:prstGeom prst="rect">
+            <a:avLst/>
+          </a:prstGeom>
+        </p:spPr>
+      </p:pic>
+      <p:pic>
+        <p:nvPicPr>
+          <p:cNvPr id="9" name="Graphic 8" descr="Line arrow: Straight with solid fill">
+            <a:extLst>
+              <a:ext uri="{FF2B5EF4-FFF2-40B4-BE49-F238E27FC236}">
+                <a16:creationId xmlns:a16="http://schemas.microsoft.com/office/drawing/2014/main" id="{B5996043-7860-FBE7-3B07-4DC9537D62ED}"/>
+              </a:ext>
+            </a:extLst>
+          </p:cNvPr>
+          <p:cNvPicPr>
+            <a:picLocks noChangeAspect="1"/>
+          </p:cNvPicPr>
+          <p:nvPr/>
+        </p:nvPicPr>
+        <p:blipFill>
+          <a:blip r:embed="rId6">
+            <a:extLst>
+              <a:ext uri="{28A0092B-C50C-407E-A947-70E740481C1C}">
+                <a14:useLocalDpi xmlns:a14="http://schemas.microsoft.com/office/drawing/2010/main" val="0"/>
+              </a:ext>
+              <a:ext uri="{96DAC541-7B7A-43D3-8B79-37D633B846F1}">
+                <asvg:svgBlip xmlns:asvg="http://schemas.microsoft.com/office/drawing/2016/SVG/main" r:embed="rId7"/>
+              </a:ext>
+            </a:extLst>
+          </a:blip>
+          <a:stretch>
+            <a:fillRect/>
+          </a:stretch>
+        </p:blipFill>
+        <p:spPr>
+          <a:xfrm rot="10800000">
+            <a:off x="8371091" y="1466491"/>
+            <a:ext cx="1176814" cy="1176814"/>
           </a:xfrm>
           <a:prstGeom prst="rect">
             <a:avLst/>
@@ -5352,7 +5394,7 @@
         </p:nvSpPr>
         <p:spPr>
           <a:xfrm>
-            <a:off x="10085784" y="2636914"/>
+            <a:off x="10197497" y="2635268"/>
             <a:ext cx="1029449" cy="523220"/>
           </a:xfrm>
           <a:prstGeom prst="rect">
@@ -5399,7 +5441,7 @@
         </p:nvSpPr>
         <p:spPr>
           <a:xfrm>
-            <a:off x="10197497" y="3525779"/>
+            <a:off x="10197497" y="3321478"/>
             <a:ext cx="1611339" cy="523220"/>
           </a:xfrm>
           <a:prstGeom prst="rect">
@@ -5476,7 +5518,13 @@
       </p:grpSpPr>
       <p:sp>
         <p:nvSpPr>
-          <p:cNvPr id="2" name="Title 1"/>
+          <p:cNvPr id="2" name="Title 1">
+            <a:extLst>
+              <a:ext uri="{FF2B5EF4-FFF2-40B4-BE49-F238E27FC236}">
+                <a16:creationId xmlns:a16="http://schemas.microsoft.com/office/drawing/2014/main" id="{870C4A5C-2A10-0639-5346-6744F1C42175}"/>
+              </a:ext>
+            </a:extLst>
+          </p:cNvPr>
           <p:cNvSpPr>
             <a:spLocks noGrp="1"/>
           </p:cNvSpPr>
@@ -5493,16 +5541,16 @@
               <a:rPr lang="en-US" dirty="0" err="1"/>
               <a:t>EventInfo</a:t>
             </a:r>
-            <a:endParaRPr lang="en-US" dirty="0"/>
+            <a:endParaRPr lang="en-CH" dirty="0"/>
           </a:p>
         </p:txBody>
       </p:sp>
       <p:pic>
         <p:nvPicPr>
-          <p:cNvPr id="6" name="Picture 5">
+          <p:cNvPr id="11" name="Picture 10">
             <a:extLst>
               <a:ext uri="{FF2B5EF4-FFF2-40B4-BE49-F238E27FC236}">
-                <a16:creationId xmlns:a16="http://schemas.microsoft.com/office/drawing/2014/main" id="{5EC881B4-0A9D-AAA0-3805-97BC4BA8F6E4}"/>
+                <a16:creationId xmlns:a16="http://schemas.microsoft.com/office/drawing/2014/main" id="{5CD1B79B-9151-5076-85AB-98E5B62089EE}"/>
               </a:ext>
             </a:extLst>
           </p:cNvPr>
@@ -5519,8 +5567,8 @@
         </p:blipFill>
         <p:spPr>
           <a:xfrm>
-            <a:off x="4963592" y="1828002"/>
-            <a:ext cx="6300830" cy="3826442"/>
+            <a:off x="1057904" y="1600200"/>
+            <a:ext cx="4504318" cy="4924902"/>
           </a:xfrm>
           <a:prstGeom prst="rect">
             <a:avLst/>
@@ -5529,10 +5577,10 @@
       </p:pic>
       <p:pic>
         <p:nvPicPr>
-          <p:cNvPr id="8" name="Picture 7">
+          <p:cNvPr id="13" name="Picture 12">
             <a:extLst>
               <a:ext uri="{FF2B5EF4-FFF2-40B4-BE49-F238E27FC236}">
-                <a16:creationId xmlns:a16="http://schemas.microsoft.com/office/drawing/2014/main" id="{1D086EA6-F07C-0AC1-95C2-66D71170BB9B}"/>
+                <a16:creationId xmlns:a16="http://schemas.microsoft.com/office/drawing/2014/main" id="{1EBDD0B6-605C-98CB-C5AB-FFC28E4F1445}"/>
               </a:ext>
             </a:extLst>
           </p:cNvPr>
@@ -5549,8 +5597,8 @@
         </p:blipFill>
         <p:spPr>
           <a:xfrm>
-            <a:off x="477788" y="1839690"/>
-            <a:ext cx="4353533" cy="2200582"/>
+            <a:off x="5734372" y="1619147"/>
+            <a:ext cx="6144482" cy="4887007"/>
           </a:xfrm>
           <a:prstGeom prst="rect">
             <a:avLst/>
@@ -5560,7 +5608,7 @@
     </p:spTree>
     <p:extLst>
       <p:ext uri="{BB962C8B-B14F-4D97-AF65-F5344CB8AC3E}">
-        <p14:creationId xmlns:p14="http://schemas.microsoft.com/office/powerpoint/2010/main" val="3388139804"/>
+        <p14:creationId xmlns:p14="http://schemas.microsoft.com/office/powerpoint/2010/main" val="1358402765"/>
       </p:ext>
     </p:extLst>
   </p:cSld>
@@ -5601,39 +5649,33 @@
       </p:grpSpPr>
       <p:sp>
         <p:nvSpPr>
-          <p:cNvPr id="2" name="Title 1">
+          <p:cNvPr id="2" name="Title 1"/>
+          <p:cNvSpPr>
+            <a:spLocks noGrp="1"/>
+          </p:cNvSpPr>
+          <p:nvPr>
+            <p:ph type="title"/>
+          </p:nvPr>
+        </p:nvSpPr>
+        <p:spPr/>
+        <p:txBody>
+          <a:bodyPr/>
+          <a:lstStyle/>
+          <a:p>
+            <a:r>
+              <a:rPr lang="en-US" dirty="0" err="1"/>
+              <a:t>EventInfo</a:t>
+            </a:r>
+            <a:endParaRPr lang="en-US" dirty="0"/>
+          </a:p>
+        </p:txBody>
+      </p:sp>
+      <p:pic>
+        <p:nvPicPr>
+          <p:cNvPr id="6" name="Picture 5">
             <a:extLst>
               <a:ext uri="{FF2B5EF4-FFF2-40B4-BE49-F238E27FC236}">
-                <a16:creationId xmlns:a16="http://schemas.microsoft.com/office/drawing/2014/main" id="{870C4A5C-2A10-0639-5346-6744F1C42175}"/>
-              </a:ext>
-            </a:extLst>
-          </p:cNvPr>
-          <p:cNvSpPr>
-            <a:spLocks noGrp="1"/>
-          </p:cNvSpPr>
-          <p:nvPr>
-            <p:ph type="title"/>
-          </p:nvPr>
-        </p:nvSpPr>
-        <p:spPr/>
-        <p:txBody>
-          <a:bodyPr/>
-          <a:lstStyle/>
-          <a:p>
-            <a:r>
-              <a:rPr lang="en-US" dirty="0" err="1"/>
-              <a:t>EventInfo</a:t>
-            </a:r>
-            <a:endParaRPr lang="en-CH" dirty="0"/>
-          </a:p>
-        </p:txBody>
-      </p:sp>
-      <p:pic>
-        <p:nvPicPr>
-          <p:cNvPr id="11" name="Picture 10">
-            <a:extLst>
-              <a:ext uri="{FF2B5EF4-FFF2-40B4-BE49-F238E27FC236}">
-                <a16:creationId xmlns:a16="http://schemas.microsoft.com/office/drawing/2014/main" id="{5CD1B79B-9151-5076-85AB-98E5B62089EE}"/>
+                <a16:creationId xmlns:a16="http://schemas.microsoft.com/office/drawing/2014/main" id="{5EC881B4-0A9D-AAA0-3805-97BC4BA8F6E4}"/>
               </a:ext>
             </a:extLst>
           </p:cNvPr>
@@ -5650,8 +5692,8 @@
         </p:blipFill>
         <p:spPr>
           <a:xfrm>
-            <a:off x="1057904" y="1600200"/>
-            <a:ext cx="4504318" cy="4924902"/>
+            <a:off x="4963592" y="1828002"/>
+            <a:ext cx="6300830" cy="3826442"/>
           </a:xfrm>
           <a:prstGeom prst="rect">
             <a:avLst/>
@@ -5660,10 +5702,10 @@
       </p:pic>
       <p:pic>
         <p:nvPicPr>
-          <p:cNvPr id="13" name="Picture 12">
+          <p:cNvPr id="8" name="Picture 7">
             <a:extLst>
               <a:ext uri="{FF2B5EF4-FFF2-40B4-BE49-F238E27FC236}">
-                <a16:creationId xmlns:a16="http://schemas.microsoft.com/office/drawing/2014/main" id="{1EBDD0B6-605C-98CB-C5AB-FFC28E4F1445}"/>
+                <a16:creationId xmlns:a16="http://schemas.microsoft.com/office/drawing/2014/main" id="{1D086EA6-F07C-0AC1-95C2-66D71170BB9B}"/>
               </a:ext>
             </a:extLst>
           </p:cNvPr>
@@ -5680,8 +5722,8 @@
         </p:blipFill>
         <p:spPr>
           <a:xfrm>
-            <a:off x="5734372" y="1619147"/>
-            <a:ext cx="6144482" cy="4887007"/>
+            <a:off x="477788" y="1839690"/>
+            <a:ext cx="4353533" cy="2200582"/>
           </a:xfrm>
           <a:prstGeom prst="rect">
             <a:avLst/>
@@ -5691,7 +5733,7 @@
     </p:spTree>
     <p:extLst>
       <p:ext uri="{BB962C8B-B14F-4D97-AF65-F5344CB8AC3E}">
-        <p14:creationId xmlns:p14="http://schemas.microsoft.com/office/powerpoint/2010/main" val="1358402765"/>
+        <p14:creationId xmlns:p14="http://schemas.microsoft.com/office/powerpoint/2010/main" val="3388139804"/>
       </p:ext>
     </p:extLst>
   </p:cSld>
@@ -5783,11 +5825,115 @@
         </p:blipFill>
         <p:spPr>
           <a:xfrm>
-            <a:off x="1047248" y="1916832"/>
-            <a:ext cx="3034145" cy="4191000"/>
+            <a:off x="6382444" y="1196752"/>
+            <a:ext cx="3466193" cy="4787779"/>
           </a:xfrm>
         </p:spPr>
       </p:pic>
+      <p:sp>
+        <p:nvSpPr>
+          <p:cNvPr id="3" name="TextBox 2">
+            <a:extLst>
+              <a:ext uri="{FF2B5EF4-FFF2-40B4-BE49-F238E27FC236}">
+                <a16:creationId xmlns:a16="http://schemas.microsoft.com/office/drawing/2014/main" id="{D68C21BE-F2F6-EE25-A713-3D2942100979}"/>
+              </a:ext>
+            </a:extLst>
+          </p:cNvPr>
+          <p:cNvSpPr txBox="1"/>
+          <p:nvPr/>
+        </p:nvSpPr>
+        <p:spPr>
+          <a:xfrm>
+            <a:off x="189756" y="1844824"/>
+            <a:ext cx="4752529" cy="3046027"/>
+          </a:xfrm>
+          <a:prstGeom prst="rect">
+            <a:avLst/>
+          </a:prstGeom>
+          <a:noFill/>
+          <a:ln>
+            <a:solidFill>
+              <a:schemeClr val="bg2"/>
+            </a:solidFill>
+          </a:ln>
+        </p:spPr>
+        <p:txBody>
+          <a:bodyPr wrap="square" rtlCol="0" anchor="ctr" anchorCtr="1">
+            <a:spAutoFit/>
+          </a:bodyPr>
+          <a:lstStyle/>
+          <a:p>
+            <a:pPr marL="285750" indent="-285750">
+              <a:lnSpc>
+                <a:spcPct val="250000"/>
+              </a:lnSpc>
+              <a:buFont typeface="Arial" panose="020B0604020202020204" pitchFamily="34" charset="0"/>
+              <a:buChar char="•"/>
+            </a:pPr>
+            <a:r>
+              <a:rPr lang="en-US" sz="2000" dirty="0"/>
+              <a:t>Singleton </a:t>
+            </a:r>
+            <a:r>
+              <a:rPr lang="en-US" sz="2000" dirty="0" err="1"/>
+              <a:t>obrazac</a:t>
+            </a:r>
+            <a:endParaRPr lang="en-US" sz="2000" dirty="0"/>
+          </a:p>
+          <a:p>
+            <a:pPr marL="285750" indent="-285750">
+              <a:lnSpc>
+                <a:spcPct val="250000"/>
+              </a:lnSpc>
+              <a:buFont typeface="Arial" panose="020B0604020202020204" pitchFamily="34" charset="0"/>
+              <a:buChar char="•"/>
+            </a:pPr>
+            <a:r>
+              <a:rPr lang="en-US" sz="2000" dirty="0" err="1"/>
+              <a:t>Struktura</a:t>
+            </a:r>
+            <a:r>
+              <a:rPr lang="en-US" sz="2000" dirty="0"/>
+              <a:t> </a:t>
+            </a:r>
+            <a:r>
+              <a:rPr lang="en-US" sz="2000" dirty="0" err="1"/>
+              <a:t>sli</a:t>
+            </a:r>
+            <a:r>
+              <a:rPr lang="sr-Latn-RS" sz="2000" dirty="0"/>
+              <a:t>čna rečniku</a:t>
+            </a:r>
+          </a:p>
+          <a:p>
+            <a:pPr marL="285750" indent="-285750">
+              <a:lnSpc>
+                <a:spcPct val="250000"/>
+              </a:lnSpc>
+              <a:buFont typeface="Arial" panose="020B0604020202020204" pitchFamily="34" charset="0"/>
+              <a:buChar char="•"/>
+            </a:pPr>
+            <a:r>
+              <a:rPr lang="sr-Latn-RS" sz="2000" dirty="0"/>
+              <a:t>PlantId kao ključ</a:t>
+            </a:r>
+          </a:p>
+          <a:p>
+            <a:pPr marL="285750" indent="-285750">
+              <a:lnSpc>
+                <a:spcPct val="250000"/>
+              </a:lnSpc>
+              <a:buFont typeface="Arial" panose="020B0604020202020204" pitchFamily="34" charset="0"/>
+              <a:buChar char="•"/>
+            </a:pPr>
+            <a:r>
+              <a:rPr lang="sr-Latn-RS" sz="2000" dirty="0"/>
+              <a:t>Koristi DataModel Interfejs</a:t>
+            </a:r>
+            <a:endParaRPr lang="en-CH" sz="2000" dirty="0"/>
+          </a:p>
+        </p:txBody>
+      </p:sp>
     </p:spTree>
     <p:extLst>
       <p:ext uri="{BB962C8B-B14F-4D97-AF65-F5344CB8AC3E}">
@@ -5951,7 +6097,7 @@
         </p:blipFill>
         <p:spPr>
           <a:xfrm>
-            <a:off x="7174532" y="3320219"/>
+            <a:off x="7102524" y="2671387"/>
             <a:ext cx="3480192" cy="1633936"/>
           </a:xfrm>
           <a:prstGeom prst="rect">

</xml_diff>